<commit_message>
Update to use newer code basead configuration model
</commit_message>
<xml_diff>
--- a/Agile Firestarter Winter 2011 Dependency Injection.pptx
+++ b/Agile Firestarter Winter 2011 Dependency Injection.pptx
@@ -5,7 +5,7 @@
     <p:sldMasterId id="2147483660" r:id="rId1"/>
   </p:sldMasterIdLst>
   <p:notesMasterIdLst>
-    <p:notesMasterId r:id="rId42"/>
+    <p:notesMasterId r:id="rId43"/>
   </p:notesMasterIdLst>
   <p:sldIdLst>
     <p:sldId id="326" r:id="rId2"/>
@@ -41,13 +41,14 @@
     <p:sldId id="315" r:id="rId32"/>
     <p:sldId id="316" r:id="rId33"/>
     <p:sldId id="317" r:id="rId34"/>
-    <p:sldId id="319" r:id="rId35"/>
-    <p:sldId id="320" r:id="rId36"/>
-    <p:sldId id="322" r:id="rId37"/>
-    <p:sldId id="321" r:id="rId38"/>
-    <p:sldId id="323" r:id="rId39"/>
-    <p:sldId id="325" r:id="rId40"/>
-    <p:sldId id="324" r:id="rId41"/>
+    <p:sldId id="321" r:id="rId35"/>
+    <p:sldId id="330" r:id="rId36"/>
+    <p:sldId id="319" r:id="rId37"/>
+    <p:sldId id="320" r:id="rId38"/>
+    <p:sldId id="322" r:id="rId39"/>
+    <p:sldId id="323" r:id="rId40"/>
+    <p:sldId id="325" r:id="rId41"/>
+    <p:sldId id="324" r:id="rId42"/>
   </p:sldIdLst>
   <p:sldSz cx="9144000" cy="6858000" type="screen4x3"/>
   <p:notesSz cx="7315200" cy="9601200"/>
@@ -232,7 +233,7 @@
             <a:fld id="{CC9D1E90-0DC1-41C0-86D7-5FF0EBE9F9D3}" type="datetimeFigureOut">
               <a:rPr lang="en-US" smtClean="0"/>
               <a:pPr/>
-              <a:t>1/15/2011</a:t>
+              <a:t>1/18/2011</a:t>
             </a:fld>
             <a:endParaRPr lang="en-US"/>
           </a:p>
@@ -403,7 +404,7 @@
     </p:spTree>
     <p:extLst>
       <p:ext uri="{BB962C8B-B14F-4D97-AF65-F5344CB8AC3E}">
-        <p14:creationId xmlns:p14="http://schemas.microsoft.com/office/powerpoint/2010/main" val="3819521632"/>
+        <p14:creationId xmlns:p14="http://schemas.microsoft.com/office/powerpoint/2010/main" xmlns="" val="3819521632"/>
       </p:ext>
     </p:extLst>
   </p:cSld>
@@ -2451,7 +2452,7 @@
                 </a:solidFill>
               </a:rPr>
               <a:pPr/>
-              <a:t>1/15/2011</a:t>
+              <a:t>1/18/2011</a:t>
             </a:fld>
             <a:endParaRPr lang="en-US">
               <a:solidFill>
@@ -12547,12 +12548,12 @@
               <a:t>Now we get our </a:t>
             </a:r>
             <a:r>
-              <a:rPr lang="en-US" dirty="0" err="1" smtClean="0"/>
-              <a:t>primte</a:t>
-            </a:r>
-            <a:r>
               <a:rPr lang="en-US" dirty="0" smtClean="0"/>
-              <a:t> numbers…</a:t>
+              <a:t>prime </a:t>
+            </a:r>
+            <a:r>
+              <a:rPr lang="en-US" dirty="0" smtClean="0"/>
+              <a:t>numbers…</a:t>
             </a:r>
             <a:endParaRPr lang="en-US" dirty="0"/>
           </a:p>
@@ -22381,13 +22382,1403 @@
         <p:spPr/>
         <p:txBody>
           <a:bodyPr>
+            <a:normAutofit/>
+          </a:bodyPr>
+          <a:lstStyle/>
+          <a:p>
+            <a:r>
+              <a:rPr lang="en-US" dirty="0" smtClean="0"/>
+              <a:t>Spring.NET Code </a:t>
+            </a:r>
+            <a:r>
+              <a:rPr lang="en-US" dirty="0" smtClean="0"/>
+              <a:t>Configuration</a:t>
+            </a:r>
+            <a:endParaRPr lang="en-US" dirty="0"/>
+          </a:p>
+        </p:txBody>
+      </p:sp>
+      <p:sp>
+        <p:nvSpPr>
+          <p:cNvPr id="3" name="Rounded Rectangle 2"/>
+          <p:cNvSpPr/>
+          <p:nvPr/>
+        </p:nvSpPr>
+        <p:spPr bwMode="blackWhite">
+          <a:xfrm>
+            <a:off x="431073" y="2286000"/>
+            <a:ext cx="7848600" cy="4267200"/>
+          </a:xfrm>
+          <a:prstGeom prst="roundRect">
+            <a:avLst>
+              <a:gd name="adj" fmla="val 7234"/>
+            </a:avLst>
+          </a:prstGeom>
+          <a:gradFill flip="none" rotWithShape="1">
+            <a:gsLst>
+              <a:gs pos="0">
+                <a:schemeClr val="bg1">
+                  <a:tint val="66000"/>
+                  <a:satMod val="160000"/>
+                </a:schemeClr>
+              </a:gs>
+              <a:gs pos="50000">
+                <a:schemeClr val="bg1">
+                  <a:tint val="44500"/>
+                  <a:satMod val="160000"/>
+                </a:schemeClr>
+              </a:gs>
+              <a:gs pos="100000">
+                <a:schemeClr val="bg1">
+                  <a:tint val="23500"/>
+                  <a:satMod val="160000"/>
+                </a:schemeClr>
+              </a:gs>
+            </a:gsLst>
+            <a:lin ang="16200000" scaled="1"/>
+            <a:tileRect/>
+          </a:gradFill>
+          <a:ln>
+            <a:solidFill>
+              <a:srgbClr val="27728D"/>
+            </a:solidFill>
+            <a:headEnd type="none" w="med" len="med"/>
+            <a:tailEnd type="none" w="med" len="med"/>
+          </a:ln>
+          <a:effectLst/>
+        </p:spPr>
+        <p:style>
+          <a:lnRef idx="0">
+            <a:schemeClr val="accent2"/>
+          </a:lnRef>
+          <a:fillRef idx="3">
+            <a:schemeClr val="accent2"/>
+          </a:fillRef>
+          <a:effectRef idx="3">
+            <a:schemeClr val="accent2"/>
+          </a:effectRef>
+          <a:fontRef idx="minor">
+            <a:schemeClr val="lt1"/>
+          </a:fontRef>
+        </p:style>
+        <p:txBody>
+          <a:bodyPr lIns="109728" tIns="54864" rIns="109728" bIns="54864" anchor="ctr"/>
+          <a:lstStyle/>
+          <a:p>
+            <a:endParaRPr lang="en-US" sz="2800" b="1" dirty="0">
+              <a:solidFill>
+                <a:schemeClr val="tx1"/>
+              </a:solidFill>
+              <a:effectLst>
+                <a:outerShdw blurRad="38100" dist="38100" dir="2700000" algn="tl">
+                  <a:srgbClr val="000000">
+                    <a:alpha val="43137"/>
+                  </a:srgbClr>
+                </a:outerShdw>
+              </a:effectLst>
+              <a:latin typeface="Arial" pitchFamily="34" charset="0"/>
+            </a:endParaRPr>
+          </a:p>
+        </p:txBody>
+      </p:sp>
+      <p:sp>
+        <p:nvSpPr>
+          <p:cNvPr id="4" name="TextBox 2"/>
+          <p:cNvSpPr txBox="1">
+            <a:spLocks noChangeArrowheads="1"/>
+          </p:cNvSpPr>
+          <p:nvPr/>
+        </p:nvSpPr>
+        <p:spPr bwMode="auto">
+          <a:xfrm>
+            <a:off x="507274" y="2286000"/>
+            <a:ext cx="7722326" cy="4185761"/>
+          </a:xfrm>
+          <a:prstGeom prst="rect">
+            <a:avLst/>
+          </a:prstGeom>
+          <a:noFill/>
+          <a:ln w="9525">
+            <a:noFill/>
+            <a:miter lim="800000"/>
+            <a:headEnd/>
+            <a:tailEnd/>
+          </a:ln>
+        </p:spPr>
+        <p:txBody>
+          <a:bodyPr wrap="square">
+            <a:spAutoFit/>
+          </a:bodyPr>
+          <a:lstStyle/>
+          <a:p>
+            <a:r>
+              <a:rPr lang="en-US" sz="1400" b="1" dirty="0" smtClean="0">
+                <a:latin typeface="Courier New" pitchFamily="49" charset="0"/>
+                <a:cs typeface="Courier New" pitchFamily="49" charset="0"/>
+              </a:rPr>
+              <a:t>[</a:t>
+            </a:r>
+            <a:r>
+              <a:rPr lang="en-US" sz="1400" b="1" dirty="0" smtClean="0">
+                <a:solidFill>
+                  <a:srgbClr val="2B91AF"/>
+                </a:solidFill>
+                <a:latin typeface="Courier New" pitchFamily="49" charset="0"/>
+                <a:cs typeface="Courier New" pitchFamily="49" charset="0"/>
+              </a:rPr>
+              <a:t>Configuration</a:t>
+            </a:r>
+            <a:r>
+              <a:rPr lang="en-US" sz="1400" b="1" dirty="0" smtClean="0">
+                <a:latin typeface="Courier New" pitchFamily="49" charset="0"/>
+                <a:cs typeface="Courier New" pitchFamily="49" charset="0"/>
+              </a:rPr>
+              <a:t>]</a:t>
+            </a:r>
+          </a:p>
+          <a:p>
+            <a:r>
+              <a:rPr lang="en-US" sz="1400" b="1" dirty="0" smtClean="0">
+                <a:solidFill>
+                  <a:srgbClr val="0000FF"/>
+                </a:solidFill>
+                <a:latin typeface="Courier New" pitchFamily="49" charset="0"/>
+                <a:cs typeface="Courier New" pitchFamily="49" charset="0"/>
+              </a:rPr>
+              <a:t>public class </a:t>
+            </a:r>
+            <a:r>
+              <a:rPr lang="en-US" sz="1400" b="1" dirty="0" err="1" smtClean="0">
+                <a:solidFill>
+                  <a:srgbClr val="2B91AF"/>
+                </a:solidFill>
+                <a:latin typeface="Courier New" pitchFamily="49" charset="0"/>
+                <a:cs typeface="Courier New" pitchFamily="49" charset="0"/>
+              </a:rPr>
+              <a:t>PrimesConfiguration</a:t>
+            </a:r>
+            <a:r>
+              <a:rPr lang="en-US" sz="1400" b="1" dirty="0" smtClean="0">
+                <a:solidFill>
+                  <a:srgbClr val="2B91AF"/>
+                </a:solidFill>
+                <a:latin typeface="Courier New" pitchFamily="49" charset="0"/>
+                <a:cs typeface="Courier New" pitchFamily="49" charset="0"/>
+              </a:rPr>
+              <a:t> </a:t>
+            </a:r>
+            <a:r>
+              <a:rPr lang="en-US" sz="1400" b="1" dirty="0" smtClean="0">
+                <a:latin typeface="Courier New" pitchFamily="49" charset="0"/>
+                <a:cs typeface="Courier New" pitchFamily="49" charset="0"/>
+              </a:rPr>
+              <a:t>{</a:t>
+            </a:r>
+          </a:p>
+          <a:p>
+            <a:endParaRPr lang="en-US" sz="1400" b="1" dirty="0" smtClean="0">
+              <a:latin typeface="Courier New" pitchFamily="49" charset="0"/>
+              <a:cs typeface="Courier New" pitchFamily="49" charset="0"/>
+            </a:endParaRPr>
+          </a:p>
+          <a:p>
+            <a:r>
+              <a:rPr lang="en-US" sz="1400" b="1" dirty="0" smtClean="0">
+                <a:latin typeface="Courier New" pitchFamily="49" charset="0"/>
+                <a:cs typeface="Courier New" pitchFamily="49" charset="0"/>
+              </a:rPr>
+              <a:t>  [</a:t>
+            </a:r>
+            <a:r>
+              <a:rPr lang="en-US" sz="1400" b="1" dirty="0" smtClean="0">
+                <a:solidFill>
+                  <a:srgbClr val="2B91AF"/>
+                </a:solidFill>
+                <a:latin typeface="Courier New" pitchFamily="49" charset="0"/>
+                <a:cs typeface="Courier New" pitchFamily="49" charset="0"/>
+              </a:rPr>
+              <a:t>Definition</a:t>
+            </a:r>
+            <a:r>
+              <a:rPr lang="en-US" sz="1400" b="1" dirty="0" smtClean="0">
+                <a:latin typeface="Courier New" pitchFamily="49" charset="0"/>
+                <a:cs typeface="Courier New" pitchFamily="49" charset="0"/>
+              </a:rPr>
+              <a:t>]</a:t>
+            </a:r>
+          </a:p>
+          <a:p>
+            <a:r>
+              <a:rPr lang="en-US" sz="1400" b="1" dirty="0" smtClean="0">
+                <a:solidFill>
+                  <a:srgbClr val="0000FF"/>
+                </a:solidFill>
+                <a:latin typeface="Courier New" pitchFamily="49" charset="0"/>
+                <a:cs typeface="Courier New" pitchFamily="49" charset="0"/>
+              </a:rPr>
+              <a:t>  public virtual </a:t>
+            </a:r>
+            <a:r>
+              <a:rPr lang="en-US" sz="1400" b="1" dirty="0" err="1" smtClean="0">
+                <a:solidFill>
+                  <a:srgbClr val="2B91AF"/>
+                </a:solidFill>
+                <a:latin typeface="Courier New" pitchFamily="49" charset="0"/>
+                <a:cs typeface="Courier New" pitchFamily="49" charset="0"/>
+              </a:rPr>
+              <a:t>ConsoleReport</a:t>
+            </a:r>
+            <a:r>
+              <a:rPr lang="en-US" sz="1400" b="1" dirty="0" smtClean="0">
+                <a:solidFill>
+                  <a:srgbClr val="2B91AF"/>
+                </a:solidFill>
+                <a:latin typeface="Courier New" pitchFamily="49" charset="0"/>
+                <a:cs typeface="Courier New" pitchFamily="49" charset="0"/>
+              </a:rPr>
+              <a:t> </a:t>
+            </a:r>
+            <a:r>
+              <a:rPr lang="en-US" sz="1400" b="1" dirty="0" err="1" smtClean="0">
+                <a:latin typeface="Courier New" pitchFamily="49" charset="0"/>
+                <a:cs typeface="Courier New" pitchFamily="49" charset="0"/>
+              </a:rPr>
+              <a:t>ConsoleReport</a:t>
+            </a:r>
+            <a:r>
+              <a:rPr lang="en-US" sz="1400" b="1" dirty="0" smtClean="0">
+                <a:latin typeface="Courier New" pitchFamily="49" charset="0"/>
+                <a:cs typeface="Courier New" pitchFamily="49" charset="0"/>
+              </a:rPr>
+              <a:t>() {</a:t>
+            </a:r>
+          </a:p>
+          <a:p>
+            <a:r>
+              <a:rPr lang="en-US" sz="1400" b="1" dirty="0" smtClean="0">
+                <a:solidFill>
+                  <a:srgbClr val="0000FF"/>
+                </a:solidFill>
+                <a:latin typeface="Courier New" pitchFamily="49" charset="0"/>
+                <a:cs typeface="Courier New" pitchFamily="49" charset="0"/>
+              </a:rPr>
+              <a:t>    return new </a:t>
+            </a:r>
+            <a:r>
+              <a:rPr lang="en-US" sz="1400" b="1" dirty="0" err="1" smtClean="0">
+                <a:solidFill>
+                  <a:srgbClr val="2B91AF"/>
+                </a:solidFill>
+                <a:latin typeface="Courier New" pitchFamily="49" charset="0"/>
+                <a:cs typeface="Courier New" pitchFamily="49" charset="0"/>
+              </a:rPr>
+              <a:t>ConsoleReport</a:t>
+            </a:r>
+            <a:r>
+              <a:rPr lang="en-US" sz="1400" b="1" dirty="0" smtClean="0">
+                <a:latin typeface="Courier New" pitchFamily="49" charset="0"/>
+                <a:cs typeface="Courier New" pitchFamily="49" charset="0"/>
+              </a:rPr>
+              <a:t>(</a:t>
+            </a:r>
+            <a:r>
+              <a:rPr lang="en-US" sz="1400" b="1" dirty="0" err="1" smtClean="0">
+                <a:latin typeface="Courier New" pitchFamily="49" charset="0"/>
+                <a:cs typeface="Courier New" pitchFamily="49" charset="0"/>
+              </a:rPr>
+              <a:t>OutputFormatter</a:t>
+            </a:r>
+            <a:r>
+              <a:rPr lang="en-US" sz="1400" b="1" dirty="0" smtClean="0">
+                <a:latin typeface="Courier New" pitchFamily="49" charset="0"/>
+                <a:cs typeface="Courier New" pitchFamily="49" charset="0"/>
+              </a:rPr>
+              <a:t>(), </a:t>
+            </a:r>
+            <a:r>
+              <a:rPr lang="en-US" sz="1400" b="1" dirty="0" err="1" smtClean="0">
+                <a:latin typeface="Courier New" pitchFamily="49" charset="0"/>
+                <a:cs typeface="Courier New" pitchFamily="49" charset="0"/>
+              </a:rPr>
+              <a:t>PrimeGenerator</a:t>
+            </a:r>
+            <a:r>
+              <a:rPr lang="en-US" sz="1400" b="1" dirty="0" smtClean="0">
+                <a:latin typeface="Courier New" pitchFamily="49" charset="0"/>
+                <a:cs typeface="Courier New" pitchFamily="49" charset="0"/>
+              </a:rPr>
+              <a:t>()) </a:t>
+            </a:r>
+          </a:p>
+          <a:p>
+            <a:r>
+              <a:rPr lang="en-US" sz="1400" b="1" dirty="0" smtClean="0">
+                <a:latin typeface="Courier New" pitchFamily="49" charset="0"/>
+                <a:cs typeface="Courier New" pitchFamily="49" charset="0"/>
+              </a:rPr>
+              <a:t>                             {</a:t>
+            </a:r>
+            <a:r>
+              <a:rPr lang="en-US" sz="1400" b="1" dirty="0" err="1" smtClean="0">
+                <a:latin typeface="Courier New" pitchFamily="49" charset="0"/>
+                <a:cs typeface="Courier New" pitchFamily="49" charset="0"/>
+              </a:rPr>
+              <a:t>MaxNumber</a:t>
+            </a:r>
+            <a:r>
+              <a:rPr lang="en-US" sz="1400" b="1" dirty="0" smtClean="0">
+                <a:latin typeface="Courier New" pitchFamily="49" charset="0"/>
+                <a:cs typeface="Courier New" pitchFamily="49" charset="0"/>
+              </a:rPr>
+              <a:t> = 1000};</a:t>
+            </a:r>
+          </a:p>
+          <a:p>
+            <a:r>
+              <a:rPr lang="en-US" sz="1400" b="1" dirty="0" smtClean="0">
+                <a:latin typeface="Courier New" pitchFamily="49" charset="0"/>
+                <a:cs typeface="Courier New" pitchFamily="49" charset="0"/>
+              </a:rPr>
+              <a:t>  }</a:t>
+            </a:r>
+          </a:p>
+          <a:p>
+            <a:endParaRPr lang="en-US" sz="1400" b="1" dirty="0" smtClean="0">
+              <a:solidFill>
+                <a:srgbClr val="2B91AF"/>
+              </a:solidFill>
+              <a:latin typeface="Courier New" pitchFamily="49" charset="0"/>
+              <a:cs typeface="Courier New" pitchFamily="49" charset="0"/>
+            </a:endParaRPr>
+          </a:p>
+          <a:p>
+            <a:r>
+              <a:rPr lang="en-US" sz="1400" b="1" dirty="0" smtClean="0">
+                <a:latin typeface="Courier New" pitchFamily="49" charset="0"/>
+                <a:cs typeface="Courier New" pitchFamily="49" charset="0"/>
+              </a:rPr>
+              <a:t>  [</a:t>
+            </a:r>
+            <a:r>
+              <a:rPr lang="en-US" sz="1400" b="1" dirty="0" smtClean="0">
+                <a:solidFill>
+                  <a:srgbClr val="2B91AF"/>
+                </a:solidFill>
+                <a:latin typeface="Courier New" pitchFamily="49" charset="0"/>
+                <a:cs typeface="Courier New" pitchFamily="49" charset="0"/>
+              </a:rPr>
+              <a:t>Definition</a:t>
+            </a:r>
+            <a:r>
+              <a:rPr lang="en-US" sz="1400" b="1" dirty="0" smtClean="0">
+                <a:latin typeface="Courier New" pitchFamily="49" charset="0"/>
+                <a:cs typeface="Courier New" pitchFamily="49" charset="0"/>
+              </a:rPr>
+              <a:t>]</a:t>
+            </a:r>
+          </a:p>
+          <a:p>
+            <a:r>
+              <a:rPr lang="en-US" sz="1400" b="1" dirty="0" smtClean="0">
+                <a:solidFill>
+                  <a:srgbClr val="0000FF"/>
+                </a:solidFill>
+                <a:latin typeface="Courier New" pitchFamily="49" charset="0"/>
+                <a:cs typeface="Courier New" pitchFamily="49" charset="0"/>
+              </a:rPr>
+              <a:t>  public virtual </a:t>
+            </a:r>
+            <a:r>
+              <a:rPr lang="en-US" sz="1400" b="1" dirty="0" err="1" smtClean="0">
+                <a:solidFill>
+                  <a:srgbClr val="2B91AF"/>
+                </a:solidFill>
+                <a:latin typeface="Courier New" pitchFamily="49" charset="0"/>
+                <a:cs typeface="Courier New" pitchFamily="49" charset="0"/>
+              </a:rPr>
+              <a:t>IOutputFormatter</a:t>
+            </a:r>
+            <a:r>
+              <a:rPr lang="en-US" sz="1400" b="1" dirty="0" smtClean="0">
+                <a:solidFill>
+                  <a:srgbClr val="2B91AF"/>
+                </a:solidFill>
+                <a:latin typeface="Courier New" pitchFamily="49" charset="0"/>
+                <a:cs typeface="Courier New" pitchFamily="49" charset="0"/>
+              </a:rPr>
+              <a:t> </a:t>
+            </a:r>
+            <a:r>
+              <a:rPr lang="en-US" sz="1400" b="1" dirty="0" err="1" smtClean="0">
+                <a:latin typeface="Courier New" pitchFamily="49" charset="0"/>
+                <a:cs typeface="Courier New" pitchFamily="49" charset="0"/>
+              </a:rPr>
+              <a:t>OutputFormatter</a:t>
+            </a:r>
+            <a:r>
+              <a:rPr lang="en-US" sz="1400" b="1" dirty="0" smtClean="0">
+                <a:latin typeface="Courier New" pitchFamily="49" charset="0"/>
+                <a:cs typeface="Courier New" pitchFamily="49" charset="0"/>
+              </a:rPr>
+              <a:t>() {</a:t>
+            </a:r>
+          </a:p>
+          <a:p>
+            <a:r>
+              <a:rPr lang="en-US" sz="1400" b="1" dirty="0" smtClean="0">
+                <a:solidFill>
+                  <a:srgbClr val="2B91AF"/>
+                </a:solidFill>
+                <a:latin typeface="Courier New" pitchFamily="49" charset="0"/>
+                <a:cs typeface="Courier New" pitchFamily="49" charset="0"/>
+              </a:rPr>
+              <a:t>    </a:t>
+            </a:r>
+            <a:r>
+              <a:rPr lang="en-US" sz="1400" b="1" dirty="0" smtClean="0">
+                <a:solidFill>
+                  <a:srgbClr val="0000FF"/>
+                </a:solidFill>
+                <a:latin typeface="Courier New" pitchFamily="49" charset="0"/>
+                <a:cs typeface="Courier New" pitchFamily="49" charset="0"/>
+              </a:rPr>
+              <a:t>return new </a:t>
+            </a:r>
+            <a:r>
+              <a:rPr lang="en-US" sz="1400" b="1" dirty="0" err="1" smtClean="0">
+                <a:solidFill>
+                  <a:srgbClr val="2B91AF"/>
+                </a:solidFill>
+                <a:latin typeface="Courier New" pitchFamily="49" charset="0"/>
+                <a:cs typeface="Courier New" pitchFamily="49" charset="0"/>
+              </a:rPr>
+              <a:t>OutputFormatter</a:t>
+            </a:r>
+            <a:r>
+              <a:rPr lang="en-US" sz="1400" b="1" dirty="0" smtClean="0">
+                <a:latin typeface="Courier New" pitchFamily="49" charset="0"/>
+                <a:cs typeface="Courier New" pitchFamily="49" charset="0"/>
+              </a:rPr>
+              <a:t>();</a:t>
+            </a:r>
+          </a:p>
+          <a:p>
+            <a:r>
+              <a:rPr lang="en-US" sz="1400" b="1" dirty="0" smtClean="0">
+                <a:latin typeface="Courier New" pitchFamily="49" charset="0"/>
+                <a:cs typeface="Courier New" pitchFamily="49" charset="0"/>
+              </a:rPr>
+              <a:t>  }</a:t>
+            </a:r>
+          </a:p>
+          <a:p>
+            <a:endParaRPr lang="en-US" sz="1400" b="1" dirty="0" smtClean="0">
+              <a:solidFill>
+                <a:srgbClr val="2B91AF"/>
+              </a:solidFill>
+              <a:latin typeface="Courier New" pitchFamily="49" charset="0"/>
+              <a:cs typeface="Courier New" pitchFamily="49" charset="0"/>
+            </a:endParaRPr>
+          </a:p>
+          <a:p>
+            <a:r>
+              <a:rPr lang="en-US" sz="1400" b="1" dirty="0" smtClean="0">
+                <a:solidFill>
+                  <a:srgbClr val="2B91AF"/>
+                </a:solidFill>
+                <a:latin typeface="Courier New" pitchFamily="49" charset="0"/>
+                <a:cs typeface="Courier New" pitchFamily="49" charset="0"/>
+              </a:rPr>
+              <a:t>  [Definition]</a:t>
+            </a:r>
+          </a:p>
+          <a:p>
+            <a:r>
+              <a:rPr lang="en-US" sz="1400" b="1" dirty="0" smtClean="0">
+                <a:solidFill>
+                  <a:srgbClr val="0000FF"/>
+                </a:solidFill>
+                <a:latin typeface="Courier New" pitchFamily="49" charset="0"/>
+                <a:cs typeface="Courier New" pitchFamily="49" charset="0"/>
+              </a:rPr>
+              <a:t>  public virtual </a:t>
+            </a:r>
+            <a:r>
+              <a:rPr lang="en-US" sz="1400" b="1" dirty="0" err="1" smtClean="0">
+                <a:solidFill>
+                  <a:srgbClr val="2B91AF"/>
+                </a:solidFill>
+                <a:latin typeface="Courier New" pitchFamily="49" charset="0"/>
+                <a:cs typeface="Courier New" pitchFamily="49" charset="0"/>
+              </a:rPr>
+              <a:t>IPrimeGenerator</a:t>
+            </a:r>
+            <a:r>
+              <a:rPr lang="en-US" sz="1400" b="1" dirty="0" smtClean="0">
+                <a:solidFill>
+                  <a:srgbClr val="2B91AF"/>
+                </a:solidFill>
+                <a:latin typeface="Courier New" pitchFamily="49" charset="0"/>
+                <a:cs typeface="Courier New" pitchFamily="49" charset="0"/>
+              </a:rPr>
+              <a:t> </a:t>
+            </a:r>
+            <a:r>
+              <a:rPr lang="en-US" sz="1400" b="1" dirty="0" err="1" smtClean="0">
+                <a:latin typeface="Courier New" pitchFamily="49" charset="0"/>
+                <a:cs typeface="Courier New" pitchFamily="49" charset="0"/>
+              </a:rPr>
+              <a:t>PrimeGenerator</a:t>
+            </a:r>
+            <a:r>
+              <a:rPr lang="en-US" sz="1400" b="1" dirty="0" smtClean="0">
+                <a:latin typeface="Courier New" pitchFamily="49" charset="0"/>
+                <a:cs typeface="Courier New" pitchFamily="49" charset="0"/>
+              </a:rPr>
+              <a:t>() </a:t>
+            </a:r>
+            <a:r>
+              <a:rPr lang="en-US" sz="1400" b="1" dirty="0" smtClean="0">
+                <a:solidFill>
+                  <a:srgbClr val="2B91AF"/>
+                </a:solidFill>
+                <a:latin typeface="Courier New" pitchFamily="49" charset="0"/>
+                <a:cs typeface="Courier New" pitchFamily="49" charset="0"/>
+              </a:rPr>
+              <a:t>{</a:t>
+            </a:r>
+          </a:p>
+          <a:p>
+            <a:r>
+              <a:rPr lang="en-US" sz="1400" b="1" dirty="0" smtClean="0">
+                <a:solidFill>
+                  <a:srgbClr val="0000FF"/>
+                </a:solidFill>
+                <a:latin typeface="Courier New" pitchFamily="49" charset="0"/>
+                <a:cs typeface="Courier New" pitchFamily="49" charset="0"/>
+              </a:rPr>
+              <a:t>    return new </a:t>
+            </a:r>
+            <a:r>
+              <a:rPr lang="en-US" sz="1400" b="1" dirty="0" err="1" smtClean="0">
+                <a:solidFill>
+                  <a:srgbClr val="2B91AF"/>
+                </a:solidFill>
+                <a:latin typeface="Courier New" pitchFamily="49" charset="0"/>
+                <a:cs typeface="Courier New" pitchFamily="49" charset="0"/>
+              </a:rPr>
+              <a:t>PrimeGenerator</a:t>
+            </a:r>
+            <a:r>
+              <a:rPr lang="en-US" sz="1400" b="1" dirty="0" smtClean="0">
+                <a:latin typeface="Courier New" pitchFamily="49" charset="0"/>
+                <a:cs typeface="Courier New" pitchFamily="49" charset="0"/>
+              </a:rPr>
+              <a:t>(</a:t>
+            </a:r>
+            <a:r>
+              <a:rPr lang="en-US" sz="1400" b="1" dirty="0" smtClean="0">
+                <a:solidFill>
+                  <a:srgbClr val="0000FF"/>
+                </a:solidFill>
+                <a:latin typeface="Courier New" pitchFamily="49" charset="0"/>
+                <a:cs typeface="Courier New" pitchFamily="49" charset="0"/>
+              </a:rPr>
+              <a:t>new </a:t>
+            </a:r>
+            <a:r>
+              <a:rPr lang="en-US" sz="1400" b="1" dirty="0" err="1" smtClean="0">
+                <a:solidFill>
+                  <a:srgbClr val="2B91AF"/>
+                </a:solidFill>
+                <a:latin typeface="Courier New" pitchFamily="49" charset="0"/>
+                <a:cs typeface="Courier New" pitchFamily="49" charset="0"/>
+              </a:rPr>
+              <a:t>PrimeEvaluationEngine</a:t>
+            </a:r>
+            <a:r>
+              <a:rPr lang="en-US" sz="1400" b="1" dirty="0" smtClean="0">
+                <a:latin typeface="Courier New" pitchFamily="49" charset="0"/>
+                <a:cs typeface="Courier New" pitchFamily="49" charset="0"/>
+              </a:rPr>
+              <a:t>());</a:t>
+            </a:r>
+          </a:p>
+          <a:p>
+            <a:r>
+              <a:rPr lang="en-US" sz="1400" b="1" dirty="0" smtClean="0">
+                <a:latin typeface="Courier New" pitchFamily="49" charset="0"/>
+                <a:cs typeface="Courier New" pitchFamily="49" charset="0"/>
+              </a:rPr>
+              <a:t>  }</a:t>
+            </a:r>
+          </a:p>
+          <a:p>
+            <a:r>
+              <a:rPr lang="en-US" sz="1400" b="1" dirty="0" smtClean="0">
+                <a:latin typeface="Courier New" pitchFamily="49" charset="0"/>
+                <a:cs typeface="Courier New" pitchFamily="49" charset="0"/>
+              </a:rPr>
+              <a:t>}</a:t>
+            </a:r>
+            <a:endParaRPr lang="en-US" sz="1400" b="1" dirty="0">
+              <a:latin typeface="Courier New" pitchFamily="49" charset="0"/>
+              <a:cs typeface="Courier New" pitchFamily="49" charset="0"/>
+            </a:endParaRPr>
+          </a:p>
+        </p:txBody>
+      </p:sp>
+    </p:spTree>
+  </p:cSld>
+  <p:clrMapOvr>
+    <a:masterClrMapping/>
+  </p:clrMapOvr>
+  <p:timing>
+    <p:tnLst>
+      <p:par>
+        <p:cTn id="1" dur="indefinite" restart="never" nodeType="tmRoot"/>
+      </p:par>
+    </p:tnLst>
+  </p:timing>
+</p:sld>
+</file>
+
+<file path=ppt/slides/slide35.xml><?xml version="1.0" encoding="utf-8"?>
+<p:sld xmlns:a="http://schemas.openxmlformats.org/drawingml/2006/main" xmlns:r="http://schemas.openxmlformats.org/officeDocument/2006/relationships" xmlns:p="http://schemas.openxmlformats.org/presentationml/2006/main">
+  <p:cSld>
+    <p:spTree>
+      <p:nvGrpSpPr>
+        <p:cNvPr id="1" name=""/>
+        <p:cNvGrpSpPr/>
+        <p:nvPr/>
+      </p:nvGrpSpPr>
+      <p:grpSpPr>
+        <a:xfrm>
+          <a:off x="0" y="0"/>
+          <a:ext cx="0" cy="0"/>
+          <a:chOff x="0" y="0"/>
+          <a:chExt cx="0" cy="0"/>
+        </a:xfrm>
+      </p:grpSpPr>
+      <p:sp>
+        <p:nvSpPr>
+          <p:cNvPr id="2" name="Title 1"/>
+          <p:cNvSpPr>
+            <a:spLocks noGrp="1"/>
+          </p:cNvSpPr>
+          <p:nvPr>
+            <p:ph type="title"/>
+          </p:nvPr>
+        </p:nvSpPr>
+        <p:spPr/>
+        <p:txBody>
+          <a:bodyPr>
             <a:normAutofit fontScale="90000"/>
           </a:bodyPr>
           <a:lstStyle/>
           <a:p>
             <a:r>
               <a:rPr lang="en-US" dirty="0" smtClean="0"/>
-              <a:t>Creating and Configuring Spring.NET  Container</a:t>
+              <a:t>Creating and Configuring Spring.NET  </a:t>
+            </a:r>
+            <a:r>
+              <a:rPr lang="en-US" dirty="0" smtClean="0"/>
+              <a:t>Container using Code </a:t>
+            </a:r>
+            <a:r>
+              <a:rPr lang="en-US" dirty="0" err="1" smtClean="0"/>
+              <a:t>Config</a:t>
+            </a:r>
+            <a:endParaRPr lang="en-US" dirty="0"/>
+          </a:p>
+        </p:txBody>
+      </p:sp>
+      <p:sp>
+        <p:nvSpPr>
+          <p:cNvPr id="4" name="Rounded Rectangle 3"/>
+          <p:cNvSpPr/>
+          <p:nvPr/>
+        </p:nvSpPr>
+        <p:spPr bwMode="blackWhite">
+          <a:xfrm>
+            <a:off x="431073" y="2122705"/>
+            <a:ext cx="7848600" cy="3211295"/>
+          </a:xfrm>
+          <a:prstGeom prst="roundRect">
+            <a:avLst>
+              <a:gd name="adj" fmla="val 7234"/>
+            </a:avLst>
+          </a:prstGeom>
+          <a:gradFill flip="none" rotWithShape="1">
+            <a:gsLst>
+              <a:gs pos="0">
+                <a:schemeClr val="bg1">
+                  <a:tint val="66000"/>
+                  <a:satMod val="160000"/>
+                </a:schemeClr>
+              </a:gs>
+              <a:gs pos="50000">
+                <a:schemeClr val="bg1">
+                  <a:tint val="44500"/>
+                  <a:satMod val="160000"/>
+                </a:schemeClr>
+              </a:gs>
+              <a:gs pos="100000">
+                <a:schemeClr val="bg1">
+                  <a:tint val="23500"/>
+                  <a:satMod val="160000"/>
+                </a:schemeClr>
+              </a:gs>
+            </a:gsLst>
+            <a:lin ang="16200000" scaled="1"/>
+            <a:tileRect/>
+          </a:gradFill>
+          <a:ln>
+            <a:solidFill>
+              <a:srgbClr val="27728D"/>
+            </a:solidFill>
+            <a:headEnd type="none" w="med" len="med"/>
+            <a:tailEnd type="none" w="med" len="med"/>
+          </a:ln>
+          <a:effectLst/>
+        </p:spPr>
+        <p:style>
+          <a:lnRef idx="0">
+            <a:schemeClr val="accent2"/>
+          </a:lnRef>
+          <a:fillRef idx="3">
+            <a:schemeClr val="accent2"/>
+          </a:fillRef>
+          <a:effectRef idx="3">
+            <a:schemeClr val="accent2"/>
+          </a:effectRef>
+          <a:fontRef idx="minor">
+            <a:schemeClr val="lt1"/>
+          </a:fontRef>
+        </p:style>
+        <p:txBody>
+          <a:bodyPr lIns="109728" tIns="54864" rIns="109728" bIns="54864" anchor="ctr"/>
+          <a:lstStyle/>
+          <a:p>
+            <a:pPr algn="ctr" defTabSz="1096963">
+              <a:defRPr/>
+            </a:pPr>
+            <a:endParaRPr lang="en-US" sz="2800" b="1" dirty="0">
+              <a:solidFill>
+                <a:schemeClr val="tx1"/>
+              </a:solidFill>
+              <a:effectLst>
+                <a:outerShdw blurRad="38100" dist="38100" dir="2700000" algn="tl">
+                  <a:srgbClr val="000000">
+                    <a:alpha val="43137"/>
+                  </a:srgbClr>
+                </a:outerShdw>
+              </a:effectLst>
+              <a:latin typeface="Arial" pitchFamily="34" charset="0"/>
+            </a:endParaRPr>
+          </a:p>
+        </p:txBody>
+      </p:sp>
+      <p:sp>
+        <p:nvSpPr>
+          <p:cNvPr id="5" name="TextBox 2"/>
+          <p:cNvSpPr txBox="1">
+            <a:spLocks noChangeArrowheads="1"/>
+          </p:cNvSpPr>
+          <p:nvPr/>
+        </p:nvSpPr>
+        <p:spPr bwMode="auto">
+          <a:xfrm>
+            <a:off x="431074" y="2198906"/>
+            <a:ext cx="7722326" cy="3754874"/>
+          </a:xfrm>
+          <a:prstGeom prst="rect">
+            <a:avLst/>
+          </a:prstGeom>
+          <a:noFill/>
+          <a:ln w="9525">
+            <a:noFill/>
+            <a:miter lim="800000"/>
+            <a:headEnd/>
+            <a:tailEnd/>
+          </a:ln>
+        </p:spPr>
+        <p:txBody>
+          <a:bodyPr wrap="square">
+            <a:spAutoFit/>
+          </a:bodyPr>
+          <a:lstStyle/>
+          <a:p>
+            <a:r>
+              <a:rPr lang="en-US" sz="1400" b="1" dirty="0" smtClean="0">
+                <a:solidFill>
+                  <a:srgbClr val="0000FF"/>
+                </a:solidFill>
+                <a:latin typeface="Courier New" pitchFamily="49" charset="0"/>
+                <a:cs typeface="Courier New" pitchFamily="49" charset="0"/>
+              </a:rPr>
+              <a:t>class </a:t>
+            </a:r>
+            <a:r>
+              <a:rPr lang="en-US" sz="1400" b="1" dirty="0" smtClean="0">
+                <a:solidFill>
+                  <a:srgbClr val="2B91AF"/>
+                </a:solidFill>
+                <a:latin typeface="Courier New" pitchFamily="49" charset="0"/>
+                <a:cs typeface="Courier New" pitchFamily="49" charset="0"/>
+              </a:rPr>
+              <a:t>Program</a:t>
+            </a:r>
+          </a:p>
+          <a:p>
+            <a:r>
+              <a:rPr lang="en-US" sz="1400" b="1" dirty="0" smtClean="0">
+                <a:latin typeface="Courier New" pitchFamily="49" charset="0"/>
+                <a:cs typeface="Courier New" pitchFamily="49" charset="0"/>
+              </a:rPr>
+              <a:t>{</a:t>
+            </a:r>
+          </a:p>
+          <a:p>
+            <a:r>
+              <a:rPr lang="en-US" sz="1400" b="1" dirty="0" smtClean="0">
+                <a:solidFill>
+                  <a:srgbClr val="0000FF"/>
+                </a:solidFill>
+                <a:latin typeface="Courier New" pitchFamily="49" charset="0"/>
+                <a:cs typeface="Courier New" pitchFamily="49" charset="0"/>
+              </a:rPr>
+              <a:t>  static void </a:t>
+            </a:r>
+            <a:r>
+              <a:rPr lang="en-US" sz="1400" b="1" dirty="0" smtClean="0">
+                <a:latin typeface="Courier New" pitchFamily="49" charset="0"/>
+                <a:cs typeface="Courier New" pitchFamily="49" charset="0"/>
+              </a:rPr>
+              <a:t>Main</a:t>
+            </a:r>
+            <a:r>
+              <a:rPr lang="en-US" sz="1400" b="1" dirty="0" smtClean="0">
+                <a:solidFill>
+                  <a:srgbClr val="0000FF"/>
+                </a:solidFill>
+                <a:latin typeface="Courier New" pitchFamily="49" charset="0"/>
+                <a:cs typeface="Courier New" pitchFamily="49" charset="0"/>
+              </a:rPr>
+              <a:t>(string</a:t>
+            </a:r>
+            <a:r>
+              <a:rPr lang="en-US" sz="1400" b="1" dirty="0" smtClean="0">
+                <a:latin typeface="Courier New" pitchFamily="49" charset="0"/>
+                <a:cs typeface="Courier New" pitchFamily="49" charset="0"/>
+              </a:rPr>
+              <a:t>[] </a:t>
+            </a:r>
+            <a:r>
+              <a:rPr lang="en-US" sz="1400" b="1" dirty="0" err="1" smtClean="0">
+                <a:solidFill>
+                  <a:srgbClr val="0000FF"/>
+                </a:solidFill>
+                <a:latin typeface="Courier New" pitchFamily="49" charset="0"/>
+                <a:cs typeface="Courier New" pitchFamily="49" charset="0"/>
+              </a:rPr>
+              <a:t>args</a:t>
+            </a:r>
+            <a:r>
+              <a:rPr lang="en-US" sz="1400" b="1" dirty="0" smtClean="0">
+                <a:solidFill>
+                  <a:srgbClr val="0000FF"/>
+                </a:solidFill>
+                <a:latin typeface="Courier New" pitchFamily="49" charset="0"/>
+                <a:cs typeface="Courier New" pitchFamily="49" charset="0"/>
+              </a:rPr>
+              <a:t>)</a:t>
+            </a:r>
+          </a:p>
+          <a:p>
+            <a:r>
+              <a:rPr lang="en-US" sz="1400" b="1" dirty="0" smtClean="0">
+                <a:latin typeface="Courier New" pitchFamily="49" charset="0"/>
+                <a:cs typeface="Courier New" pitchFamily="49" charset="0"/>
+              </a:rPr>
+              <a:t>  {</a:t>
+            </a:r>
+          </a:p>
+          <a:p>
+            <a:r>
+              <a:rPr lang="en-US" sz="1400" b="1" dirty="0" smtClean="0">
+                <a:solidFill>
+                  <a:srgbClr val="0000FF"/>
+                </a:solidFill>
+                <a:latin typeface="Courier New" pitchFamily="49" charset="0"/>
+                <a:cs typeface="Courier New" pitchFamily="49" charset="0"/>
+              </a:rPr>
+              <a:t>    using (</a:t>
+            </a:r>
+            <a:r>
+              <a:rPr lang="en-US" sz="1400" b="1" dirty="0" err="1" smtClean="0">
+                <a:solidFill>
+                  <a:srgbClr val="0000FF"/>
+                </a:solidFill>
+                <a:latin typeface="Courier New" pitchFamily="49" charset="0"/>
+                <a:cs typeface="Courier New" pitchFamily="49" charset="0"/>
+              </a:rPr>
+              <a:t>var</a:t>
+            </a:r>
+            <a:r>
+              <a:rPr lang="en-US" sz="1400" b="1" dirty="0" smtClean="0">
+                <a:solidFill>
+                  <a:srgbClr val="0000FF"/>
+                </a:solidFill>
+                <a:latin typeface="Courier New" pitchFamily="49" charset="0"/>
+                <a:cs typeface="Courier New" pitchFamily="49" charset="0"/>
+              </a:rPr>
+              <a:t> </a:t>
+            </a:r>
+            <a:r>
+              <a:rPr lang="en-US" sz="1400" b="1" dirty="0" smtClean="0">
+                <a:latin typeface="Courier New" pitchFamily="49" charset="0"/>
+                <a:cs typeface="Courier New" pitchFamily="49" charset="0"/>
+              </a:rPr>
+              <a:t>container</a:t>
+            </a:r>
+            <a:r>
+              <a:rPr lang="en-US" sz="1400" b="1" dirty="0" smtClean="0">
+                <a:solidFill>
+                  <a:srgbClr val="0000FF"/>
+                </a:solidFill>
+                <a:latin typeface="Courier New" pitchFamily="49" charset="0"/>
+                <a:cs typeface="Courier New" pitchFamily="49" charset="0"/>
+              </a:rPr>
+              <a:t> = new </a:t>
+            </a:r>
+            <a:r>
+              <a:rPr lang="en-US" sz="1400" b="1" dirty="0" err="1" smtClean="0">
+                <a:solidFill>
+                  <a:srgbClr val="2B91AF"/>
+                </a:solidFill>
+                <a:latin typeface="Courier New" pitchFamily="49" charset="0"/>
+                <a:cs typeface="Courier New" pitchFamily="49" charset="0"/>
+              </a:rPr>
+              <a:t>ScanningApplication</a:t>
+            </a:r>
+            <a:r>
+              <a:rPr lang="en-US" sz="1400" b="1" dirty="0" err="1" smtClean="0">
+                <a:solidFill>
+                  <a:srgbClr val="2B91AF"/>
+                </a:solidFill>
+                <a:latin typeface="Courier New" pitchFamily="49" charset="0"/>
+                <a:cs typeface="Courier New" pitchFamily="49" charset="0"/>
+              </a:rPr>
+              <a:t>Context</a:t>
+            </a:r>
+            <a:r>
+              <a:rPr lang="en-US" sz="1400" b="1" dirty="0" smtClean="0">
+                <a:latin typeface="Courier New" pitchFamily="49" charset="0"/>
+                <a:cs typeface="Courier New" pitchFamily="49" charset="0"/>
+              </a:rPr>
+              <a:t>())</a:t>
+            </a:r>
+            <a:endParaRPr lang="en-US" sz="1400" b="1" dirty="0" smtClean="0">
+              <a:latin typeface="Courier New" pitchFamily="49" charset="0"/>
+              <a:cs typeface="Courier New" pitchFamily="49" charset="0"/>
+            </a:endParaRPr>
+          </a:p>
+          <a:p>
+            <a:r>
+              <a:rPr lang="en-US" sz="1400" b="1" dirty="0" smtClean="0">
+                <a:latin typeface="Courier New" pitchFamily="49" charset="0"/>
+                <a:cs typeface="Courier New" pitchFamily="49" charset="0"/>
+              </a:rPr>
+              <a:t>    </a:t>
+            </a:r>
+            <a:r>
+              <a:rPr lang="en-US" sz="1400" b="1" dirty="0" smtClean="0">
+                <a:latin typeface="Courier New" pitchFamily="49" charset="0"/>
+                <a:cs typeface="Courier New" pitchFamily="49" charset="0"/>
+              </a:rPr>
+              <a:t>{</a:t>
+            </a:r>
+          </a:p>
+          <a:p>
+            <a:r>
+              <a:rPr lang="en-US" sz="1400" b="1" dirty="0" smtClean="0">
+                <a:latin typeface="Courier New" pitchFamily="49" charset="0"/>
+                <a:cs typeface="Courier New" pitchFamily="49" charset="0"/>
+              </a:rPr>
+              <a:t>       </a:t>
+            </a:r>
+            <a:r>
+              <a:rPr lang="en-US" sz="1400" b="1" dirty="0" smtClean="0">
+                <a:solidFill>
+                  <a:srgbClr val="008000"/>
+                </a:solidFill>
+                <a:latin typeface="Courier New" pitchFamily="49" charset="0"/>
+                <a:cs typeface="Courier New" pitchFamily="49" charset="0"/>
+              </a:rPr>
+              <a:t>//scan over all .</a:t>
+            </a:r>
+            <a:r>
+              <a:rPr lang="en-US" sz="1400" b="1" dirty="0" err="1" smtClean="0">
+                <a:solidFill>
+                  <a:srgbClr val="008000"/>
+                </a:solidFill>
+                <a:latin typeface="Courier New" pitchFamily="49" charset="0"/>
+                <a:cs typeface="Courier New" pitchFamily="49" charset="0"/>
+              </a:rPr>
+              <a:t>dll</a:t>
+            </a:r>
+            <a:r>
+              <a:rPr lang="en-US" sz="1400" b="1" dirty="0" smtClean="0">
+                <a:solidFill>
+                  <a:srgbClr val="008000"/>
+                </a:solidFill>
+                <a:latin typeface="Courier New" pitchFamily="49" charset="0"/>
+                <a:cs typeface="Courier New" pitchFamily="49" charset="0"/>
+              </a:rPr>
+              <a:t>/.exe to find object definitions</a:t>
+            </a:r>
+            <a:endParaRPr lang="en-US" sz="1400" b="1" dirty="0" smtClean="0">
+              <a:latin typeface="Courier New" pitchFamily="49" charset="0"/>
+              <a:cs typeface="Courier New" pitchFamily="49" charset="0"/>
+            </a:endParaRPr>
+          </a:p>
+          <a:p>
+            <a:r>
+              <a:rPr lang="en-US" sz="1400" b="1" dirty="0" smtClean="0">
+                <a:latin typeface="Courier New" pitchFamily="49" charset="0"/>
+                <a:cs typeface="Courier New" pitchFamily="49" charset="0"/>
+              </a:rPr>
+              <a:t>       </a:t>
+            </a:r>
+            <a:r>
+              <a:rPr lang="en-US" sz="1400" b="1" dirty="0" err="1" smtClean="0">
+                <a:latin typeface="Courier New" pitchFamily="49" charset="0"/>
+                <a:cs typeface="Courier New" pitchFamily="49" charset="0"/>
+              </a:rPr>
+              <a:t>container</a:t>
+            </a:r>
+            <a:r>
+              <a:rPr lang="en-US" sz="1400" b="1" dirty="0" err="1" smtClean="0">
+                <a:latin typeface="Courier New" pitchFamily="49" charset="0"/>
+                <a:cs typeface="Courier New" pitchFamily="49" charset="0"/>
+              </a:rPr>
+              <a:t>.Scan</a:t>
+            </a:r>
+            <a:r>
+              <a:rPr lang="en-US" sz="1400" b="1" dirty="0" smtClean="0">
+                <a:latin typeface="Courier New" pitchFamily="49" charset="0"/>
+                <a:cs typeface="Courier New" pitchFamily="49" charset="0"/>
+              </a:rPr>
+              <a:t>();</a:t>
+            </a:r>
+          </a:p>
+          <a:p>
+            <a:r>
+              <a:rPr lang="en-US" sz="1400" b="1" dirty="0" smtClean="0">
+                <a:solidFill>
+                  <a:srgbClr val="008000"/>
+                </a:solidFill>
+                <a:latin typeface="Courier New" pitchFamily="49" charset="0"/>
+                <a:cs typeface="Courier New" pitchFamily="49" charset="0"/>
+              </a:rPr>
+              <a:t>       //initialize object definitions</a:t>
+            </a:r>
+            <a:endParaRPr lang="en-US" sz="1400" b="1" dirty="0" smtClean="0">
+              <a:latin typeface="Courier New" pitchFamily="49" charset="0"/>
+              <a:cs typeface="Courier New" pitchFamily="49" charset="0"/>
+            </a:endParaRPr>
+          </a:p>
+          <a:p>
+            <a:r>
+              <a:rPr lang="en-US" sz="1400" b="1" dirty="0" smtClean="0">
+                <a:latin typeface="Courier New" pitchFamily="49" charset="0"/>
+                <a:cs typeface="Courier New" pitchFamily="49" charset="0"/>
+              </a:rPr>
+              <a:t>       </a:t>
+            </a:r>
+            <a:r>
+              <a:rPr lang="en-US" sz="1400" b="1" dirty="0" err="1" smtClean="0">
+                <a:latin typeface="Courier New" pitchFamily="49" charset="0"/>
+                <a:cs typeface="Courier New" pitchFamily="49" charset="0"/>
+              </a:rPr>
+              <a:t>container.Refresh</a:t>
+            </a:r>
+            <a:r>
+              <a:rPr lang="en-US" sz="1400" b="1" dirty="0" smtClean="0">
+                <a:latin typeface="Courier New" pitchFamily="49" charset="0"/>
+                <a:cs typeface="Courier New" pitchFamily="49" charset="0"/>
+              </a:rPr>
+              <a:t>();</a:t>
+            </a:r>
+            <a:endParaRPr lang="en-US" sz="1400" b="1" dirty="0" smtClean="0">
+              <a:latin typeface="Courier New" pitchFamily="49" charset="0"/>
+              <a:cs typeface="Courier New" pitchFamily="49" charset="0"/>
+            </a:endParaRPr>
+          </a:p>
+          <a:p>
+            <a:r>
+              <a:rPr lang="en-US" sz="1400" b="1" dirty="0" smtClean="0">
+                <a:solidFill>
+                  <a:srgbClr val="008000"/>
+                </a:solidFill>
+                <a:latin typeface="Courier New" pitchFamily="49" charset="0"/>
+                <a:cs typeface="Courier New" pitchFamily="49" charset="0"/>
+              </a:rPr>
+              <a:t>       //ask container for objects (configured) and use them</a:t>
+            </a:r>
+          </a:p>
+          <a:p>
+            <a:r>
+              <a:rPr lang="en-US" sz="1400" b="1" dirty="0" smtClean="0">
+                <a:solidFill>
+                  <a:srgbClr val="0000FF"/>
+                </a:solidFill>
+                <a:latin typeface="Courier New" pitchFamily="49" charset="0"/>
+                <a:cs typeface="Courier New" pitchFamily="49" charset="0"/>
+              </a:rPr>
+              <a:t>       </a:t>
+            </a:r>
+            <a:r>
+              <a:rPr lang="en-US" sz="1400" b="1" dirty="0" err="1" smtClean="0">
+                <a:solidFill>
+                  <a:srgbClr val="0000FF"/>
+                </a:solidFill>
+                <a:latin typeface="Courier New" pitchFamily="49" charset="0"/>
+                <a:cs typeface="Courier New" pitchFamily="49" charset="0"/>
+              </a:rPr>
+              <a:t>var</a:t>
+            </a:r>
+            <a:r>
+              <a:rPr lang="en-US" sz="1400" b="1" dirty="0" smtClean="0">
+                <a:solidFill>
+                  <a:srgbClr val="0000FF"/>
+                </a:solidFill>
+                <a:latin typeface="Courier New" pitchFamily="49" charset="0"/>
+                <a:cs typeface="Courier New" pitchFamily="49" charset="0"/>
+              </a:rPr>
+              <a:t> </a:t>
+            </a:r>
+            <a:r>
+              <a:rPr lang="en-US" sz="1400" b="1" dirty="0" smtClean="0">
+                <a:latin typeface="Courier New" pitchFamily="49" charset="0"/>
+                <a:cs typeface="Courier New" pitchFamily="49" charset="0"/>
+              </a:rPr>
+              <a:t>report</a:t>
+            </a:r>
+            <a:r>
+              <a:rPr lang="en-US" sz="1400" b="1" dirty="0" smtClean="0">
+                <a:solidFill>
+                  <a:srgbClr val="0000FF"/>
+                </a:solidFill>
+                <a:latin typeface="Courier New" pitchFamily="49" charset="0"/>
+                <a:cs typeface="Courier New" pitchFamily="49" charset="0"/>
+              </a:rPr>
+              <a:t> = </a:t>
+            </a:r>
+            <a:r>
+              <a:rPr lang="en-US" sz="1400" b="1" dirty="0" smtClean="0">
+                <a:latin typeface="Courier New" pitchFamily="49" charset="0"/>
+                <a:cs typeface="Courier New" pitchFamily="49" charset="0"/>
+              </a:rPr>
+              <a:t>container[</a:t>
+            </a:r>
+            <a:r>
+              <a:rPr lang="en-US" sz="1400" b="1" dirty="0" smtClean="0">
+                <a:solidFill>
+                  <a:srgbClr val="A31515"/>
+                </a:solidFill>
+                <a:latin typeface="Courier New" pitchFamily="49" charset="0"/>
+                <a:cs typeface="Courier New" pitchFamily="49" charset="0"/>
+              </a:rPr>
+              <a:t>"</a:t>
+            </a:r>
+            <a:r>
+              <a:rPr lang="en-US" sz="1400" b="1" dirty="0" err="1" smtClean="0">
+                <a:solidFill>
+                  <a:srgbClr val="A31515"/>
+                </a:solidFill>
+                <a:latin typeface="Courier New" pitchFamily="49" charset="0"/>
+                <a:cs typeface="Courier New" pitchFamily="49" charset="0"/>
+              </a:rPr>
+              <a:t>ConsoleReport</a:t>
+            </a:r>
+            <a:r>
+              <a:rPr lang="en-US" sz="1400" b="1" dirty="0" smtClean="0">
+                <a:solidFill>
+                  <a:srgbClr val="A31515"/>
+                </a:solidFill>
+                <a:latin typeface="Courier New" pitchFamily="49" charset="0"/>
+                <a:cs typeface="Courier New" pitchFamily="49" charset="0"/>
+              </a:rPr>
+              <a:t>"] </a:t>
+            </a:r>
+            <a:r>
+              <a:rPr lang="en-US" sz="1400" b="1" dirty="0" smtClean="0">
+                <a:solidFill>
+                  <a:srgbClr val="0000FF"/>
+                </a:solidFill>
+                <a:latin typeface="Courier New" pitchFamily="49" charset="0"/>
+                <a:cs typeface="Courier New" pitchFamily="49" charset="0"/>
+              </a:rPr>
+              <a:t>as </a:t>
+            </a:r>
+            <a:r>
+              <a:rPr lang="en-US" sz="1400" b="1" dirty="0" err="1" smtClean="0">
+                <a:solidFill>
+                  <a:srgbClr val="2B91AF"/>
+                </a:solidFill>
+                <a:latin typeface="Courier New" pitchFamily="49" charset="0"/>
+                <a:cs typeface="Courier New" pitchFamily="49" charset="0"/>
+              </a:rPr>
+              <a:t>ConsoleReport</a:t>
+            </a:r>
+            <a:r>
+              <a:rPr lang="en-US" sz="1400" b="1" dirty="0" smtClean="0">
+                <a:solidFill>
+                  <a:srgbClr val="2B91AF"/>
+                </a:solidFill>
+                <a:latin typeface="Courier New" pitchFamily="49" charset="0"/>
+                <a:cs typeface="Courier New" pitchFamily="49" charset="0"/>
+              </a:rPr>
+              <a:t>;</a:t>
+            </a:r>
+            <a:endParaRPr lang="en-US" sz="1400" b="1" dirty="0" smtClean="0">
+              <a:latin typeface="Courier New" pitchFamily="49" charset="0"/>
+              <a:cs typeface="Courier New" pitchFamily="49" charset="0"/>
+            </a:endParaRPr>
+          </a:p>
+          <a:p>
+            <a:r>
+              <a:rPr lang="en-US" sz="1400" b="1" dirty="0" smtClean="0">
+                <a:latin typeface="Courier New" pitchFamily="49" charset="0"/>
+                <a:cs typeface="Courier New" pitchFamily="49" charset="0"/>
+              </a:rPr>
+              <a:t>       </a:t>
+            </a:r>
+            <a:r>
+              <a:rPr lang="en-US" sz="1400" b="1" dirty="0" err="1" smtClean="0">
+                <a:latin typeface="Courier New" pitchFamily="49" charset="0"/>
+                <a:cs typeface="Courier New" pitchFamily="49" charset="0"/>
+              </a:rPr>
+              <a:t>report.Write</a:t>
+            </a:r>
+            <a:r>
+              <a:rPr lang="en-US" sz="1400" b="1" dirty="0" smtClean="0">
+                <a:latin typeface="Courier New" pitchFamily="49" charset="0"/>
+                <a:cs typeface="Courier New" pitchFamily="49" charset="0"/>
+              </a:rPr>
+              <a:t>();</a:t>
+            </a:r>
+          </a:p>
+          <a:p>
+            <a:r>
+              <a:rPr lang="en-US" sz="1400" b="1" dirty="0" smtClean="0">
+                <a:latin typeface="Courier New" pitchFamily="49" charset="0"/>
+                <a:cs typeface="Courier New" pitchFamily="49" charset="0"/>
+              </a:rPr>
+              <a:t>    }</a:t>
+            </a:r>
+            <a:r>
+              <a:rPr lang="en-US" sz="1400" b="1" dirty="0" smtClean="0">
+                <a:solidFill>
+                  <a:srgbClr val="008000"/>
+                </a:solidFill>
+                <a:latin typeface="Courier New" pitchFamily="49" charset="0"/>
+                <a:cs typeface="Courier New" pitchFamily="49" charset="0"/>
+              </a:rPr>
+              <a:t>    </a:t>
+            </a:r>
+            <a:endParaRPr lang="en-US" sz="1400" b="1" dirty="0" smtClean="0">
+              <a:latin typeface="Courier New" pitchFamily="49" charset="0"/>
+              <a:cs typeface="Courier New" pitchFamily="49" charset="0"/>
+            </a:endParaRPr>
+          </a:p>
+          <a:p>
+            <a:r>
+              <a:rPr lang="en-US" sz="1400" b="1" dirty="0" smtClean="0">
+                <a:latin typeface="Courier New" pitchFamily="49" charset="0"/>
+                <a:cs typeface="Courier New" pitchFamily="49" charset="0"/>
+              </a:rPr>
+              <a:t>  }</a:t>
+            </a:r>
+          </a:p>
+          <a:p>
+            <a:r>
+              <a:rPr lang="en-US" sz="1400" b="1" dirty="0" smtClean="0">
+                <a:latin typeface="Courier New" pitchFamily="49" charset="0"/>
+                <a:cs typeface="Courier New" pitchFamily="49" charset="0"/>
+              </a:rPr>
+              <a:t>}</a:t>
+            </a:r>
+          </a:p>
+          <a:p>
+            <a:endParaRPr lang="en-US" sz="1400" b="1" dirty="0">
+              <a:solidFill>
+                <a:srgbClr val="A31515"/>
+              </a:solidFill>
+              <a:latin typeface="Courier New" pitchFamily="49" charset="0"/>
+              <a:cs typeface="Courier New" pitchFamily="49" charset="0"/>
+            </a:endParaRPr>
+          </a:p>
+        </p:txBody>
+      </p:sp>
+    </p:spTree>
+  </p:cSld>
+  <p:clrMapOvr>
+    <a:masterClrMapping/>
+  </p:clrMapOvr>
+  <p:timing>
+    <p:tnLst>
+      <p:par>
+        <p:cTn id="1" dur="indefinite" restart="never" nodeType="tmRoot"/>
+      </p:par>
+    </p:tnLst>
+  </p:timing>
+</p:sld>
+</file>
+
+<file path=ppt/slides/slide36.xml><?xml version="1.0" encoding="utf-8"?>
+<p:sld xmlns:a="http://schemas.openxmlformats.org/drawingml/2006/main" xmlns:r="http://schemas.openxmlformats.org/officeDocument/2006/relationships" xmlns:p="http://schemas.openxmlformats.org/presentationml/2006/main">
+  <p:cSld>
+    <p:spTree>
+      <p:nvGrpSpPr>
+        <p:cNvPr id="1" name=""/>
+        <p:cNvGrpSpPr/>
+        <p:nvPr/>
+      </p:nvGrpSpPr>
+      <p:grpSpPr>
+        <a:xfrm>
+          <a:off x="0" y="0"/>
+          <a:ext cx="0" cy="0"/>
+          <a:chOff x="0" y="0"/>
+          <a:chExt cx="0" cy="0"/>
+        </a:xfrm>
+      </p:grpSpPr>
+      <p:sp>
+        <p:nvSpPr>
+          <p:cNvPr id="2" name="Title 1"/>
+          <p:cNvSpPr>
+            <a:spLocks noGrp="1"/>
+          </p:cNvSpPr>
+          <p:nvPr>
+            <p:ph type="title"/>
+          </p:nvPr>
+        </p:nvSpPr>
+        <p:spPr/>
+        <p:txBody>
+          <a:bodyPr>
+            <a:normAutofit fontScale="90000"/>
+          </a:bodyPr>
+          <a:lstStyle/>
+          <a:p>
+            <a:r>
+              <a:rPr lang="en-US" dirty="0" smtClean="0"/>
+              <a:t>Creating and Configuring Spring.NET  </a:t>
+            </a:r>
+            <a:r>
+              <a:rPr lang="en-US" dirty="0" smtClean="0"/>
+              <a:t>Container using XML object definitions</a:t>
             </a:r>
             <a:endParaRPr lang="en-US" dirty="0"/>
           </a:p>
@@ -22918,7 +24309,7 @@
 </p:sld>
 </file>
 
-<file path=ppt/slides/slide35.xml><?xml version="1.0" encoding="utf-8"?>
+<file path=ppt/slides/slide37.xml><?xml version="1.0" encoding="utf-8"?>
 <p:sld xmlns:a="http://schemas.openxmlformats.org/drawingml/2006/main" xmlns:r="http://schemas.openxmlformats.org/officeDocument/2006/relationships" xmlns:p="http://schemas.openxmlformats.org/presentationml/2006/main">
   <p:cSld>
     <p:spTree>
@@ -22967,7 +24358,7 @@
         <p:spPr bwMode="blackWhite">
           <a:xfrm>
             <a:off x="431073" y="2286000"/>
-            <a:ext cx="7848600" cy="2819400"/>
+            <a:ext cx="7848600" cy="3124200"/>
           </a:xfrm>
           <a:prstGeom prst="roundRect">
             <a:avLst>
@@ -23052,7 +24443,7 @@
         <p:spPr bwMode="auto">
           <a:xfrm>
             <a:off x="507274" y="2286000"/>
-            <a:ext cx="7722326" cy="2677656"/>
+            <a:ext cx="7722326" cy="3108543"/>
           </a:xfrm>
           <a:prstGeom prst="rect">
             <a:avLst/>
@@ -23302,8 +24693,139 @@
                 <a:latin typeface="Courier New" pitchFamily="49" charset="0"/>
                 <a:cs typeface="Courier New" pitchFamily="49" charset="0"/>
               </a:rPr>
-              <a:t>, Primes"/&gt;</a:t>
-            </a:r>
+              <a:t>, Primes"&gt;</a:t>
+            </a:r>
+          </a:p>
+          <a:p>
+            <a:r>
+              <a:rPr lang="en-US" sz="1400" b="1" dirty="0" smtClean="0">
+                <a:solidFill>
+                  <a:srgbClr val="0000FF"/>
+                </a:solidFill>
+                <a:latin typeface="Courier New" pitchFamily="49" charset="0"/>
+                <a:cs typeface="Courier New" pitchFamily="49" charset="0"/>
+              </a:rPr>
+              <a:t>    &lt;</a:t>
+            </a:r>
+            <a:r>
+              <a:rPr lang="en-US" sz="1400" b="1" dirty="0" smtClean="0">
+                <a:solidFill>
+                  <a:srgbClr val="A31515"/>
+                </a:solidFill>
+                <a:latin typeface="Courier New" pitchFamily="49" charset="0"/>
+                <a:cs typeface="Courier New" pitchFamily="49" charset="0"/>
+              </a:rPr>
+              <a:t>property</a:t>
+            </a:r>
+            <a:r>
+              <a:rPr lang="en-US" sz="1400" b="1" dirty="0" smtClean="0">
+                <a:solidFill>
+                  <a:srgbClr val="0000FF"/>
+                </a:solidFill>
+                <a:latin typeface="Courier New" pitchFamily="49" charset="0"/>
+                <a:cs typeface="Courier New" pitchFamily="49" charset="0"/>
+              </a:rPr>
+              <a:t> </a:t>
+            </a:r>
+            <a:r>
+              <a:rPr lang="en-US" sz="1400" b="1" dirty="0" smtClean="0">
+                <a:solidFill>
+                  <a:srgbClr val="FF0000"/>
+                </a:solidFill>
+                <a:latin typeface="Courier New" pitchFamily="49" charset="0"/>
+                <a:cs typeface="Courier New" pitchFamily="49" charset="0"/>
+              </a:rPr>
+              <a:t>name</a:t>
+            </a:r>
+            <a:r>
+              <a:rPr lang="en-US" sz="1400" b="1" dirty="0" smtClean="0">
+                <a:solidFill>
+                  <a:srgbClr val="0000FF"/>
+                </a:solidFill>
+                <a:latin typeface="Courier New" pitchFamily="49" charset="0"/>
+                <a:cs typeface="Courier New" pitchFamily="49" charset="0"/>
+              </a:rPr>
+              <a:t>="</a:t>
+            </a:r>
+            <a:r>
+              <a:rPr lang="en-US" sz="1400" b="1" dirty="0" err="1" smtClean="0">
+                <a:solidFill>
+                  <a:srgbClr val="0000FF"/>
+                </a:solidFill>
+                <a:latin typeface="Courier New" pitchFamily="49" charset="0"/>
+                <a:cs typeface="Courier New" pitchFamily="49" charset="0"/>
+              </a:rPr>
+              <a:t>MaxNumber</a:t>
+            </a:r>
+            <a:r>
+              <a:rPr lang="en-US" sz="1400" b="1" dirty="0" smtClean="0">
+                <a:solidFill>
+                  <a:srgbClr val="0000FF"/>
+                </a:solidFill>
+                <a:latin typeface="Courier New" pitchFamily="49" charset="0"/>
+                <a:cs typeface="Courier New" pitchFamily="49" charset="0"/>
+              </a:rPr>
+              <a:t>" </a:t>
+            </a:r>
+            <a:r>
+              <a:rPr lang="en-US" sz="1400" b="1" dirty="0" smtClean="0">
+                <a:solidFill>
+                  <a:srgbClr val="FF0000"/>
+                </a:solidFill>
+                <a:latin typeface="Courier New" pitchFamily="49" charset="0"/>
+                <a:cs typeface="Courier New" pitchFamily="49" charset="0"/>
+              </a:rPr>
+              <a:t>value</a:t>
+            </a:r>
+            <a:r>
+              <a:rPr lang="en-US" sz="1400" b="1" dirty="0" smtClean="0">
+                <a:solidFill>
+                  <a:srgbClr val="0000FF"/>
+                </a:solidFill>
+                <a:latin typeface="Courier New" pitchFamily="49" charset="0"/>
+                <a:cs typeface="Courier New" pitchFamily="49" charset="0"/>
+              </a:rPr>
+              <a:t>="1000"/&gt;</a:t>
+            </a:r>
+          </a:p>
+          <a:p>
+            <a:r>
+              <a:rPr lang="en-US" sz="1400" b="1" dirty="0" smtClean="0">
+                <a:solidFill>
+                  <a:srgbClr val="0000FF"/>
+                </a:solidFill>
+                <a:latin typeface="Courier New" pitchFamily="49" charset="0"/>
+                <a:cs typeface="Courier New" pitchFamily="49" charset="0"/>
+              </a:rPr>
+              <a:t>  &lt;/</a:t>
+            </a:r>
+            <a:r>
+              <a:rPr lang="en-US" sz="1400" b="1" dirty="0" smtClean="0">
+                <a:solidFill>
+                  <a:srgbClr val="A31515"/>
+                </a:solidFill>
+                <a:latin typeface="Courier New" pitchFamily="49" charset="0"/>
+                <a:cs typeface="Courier New" pitchFamily="49" charset="0"/>
+              </a:rPr>
+              <a:t>object</a:t>
+            </a:r>
+            <a:r>
+              <a:rPr lang="en-US" sz="1400" b="1" dirty="0" smtClean="0">
+                <a:solidFill>
+                  <a:srgbClr val="0000FF"/>
+                </a:solidFill>
+                <a:latin typeface="Courier New" pitchFamily="49" charset="0"/>
+                <a:cs typeface="Courier New" pitchFamily="49" charset="0"/>
+              </a:rPr>
+              <a:t>&gt;</a:t>
+            </a:r>
+            <a:endParaRPr lang="en-US" sz="1400" b="1" dirty="0" smtClean="0">
+              <a:solidFill>
+                <a:srgbClr val="0000FF"/>
+              </a:solidFill>
+              <a:latin typeface="Courier New" pitchFamily="49" charset="0"/>
+              <a:cs typeface="Courier New" pitchFamily="49" charset="0"/>
+            </a:endParaRPr>
           </a:p>
           <a:p>
             <a:endParaRPr lang="en-US" sz="1400" b="1" dirty="0" smtClean="0">
@@ -23738,7 +25260,7 @@
 </p:sld>
 </file>
 
-<file path=ppt/slides/slide36.xml><?xml version="1.0" encoding="utf-8"?>
+<file path=ppt/slides/slide38.xml><?xml version="1.0" encoding="utf-8"?>
 <p:sld xmlns:a="http://schemas.openxmlformats.org/drawingml/2006/main" xmlns:r="http://schemas.openxmlformats.org/officeDocument/2006/relationships" xmlns:p="http://schemas.openxmlformats.org/presentationml/2006/main">
   <p:cSld>
     <p:spTree>
@@ -25038,854 +26560,6 @@
 </p:sld>
 </file>
 
-<file path=ppt/slides/slide37.xml><?xml version="1.0" encoding="utf-8"?>
-<p:sld xmlns:a="http://schemas.openxmlformats.org/drawingml/2006/main" xmlns:r="http://schemas.openxmlformats.org/officeDocument/2006/relationships" xmlns:p="http://schemas.openxmlformats.org/presentationml/2006/main">
-  <p:cSld>
-    <p:spTree>
-      <p:nvGrpSpPr>
-        <p:cNvPr id="1" name=""/>
-        <p:cNvGrpSpPr/>
-        <p:nvPr/>
-      </p:nvGrpSpPr>
-      <p:grpSpPr>
-        <a:xfrm>
-          <a:off x="0" y="0"/>
-          <a:ext cx="0" cy="0"/>
-          <a:chOff x="0" y="0"/>
-          <a:chExt cx="0" cy="0"/>
-        </a:xfrm>
-      </p:grpSpPr>
-      <p:sp>
-        <p:nvSpPr>
-          <p:cNvPr id="2" name="Title 1"/>
-          <p:cNvSpPr>
-            <a:spLocks noGrp="1"/>
-          </p:cNvSpPr>
-          <p:nvPr>
-            <p:ph type="title"/>
-          </p:nvPr>
-        </p:nvSpPr>
-        <p:spPr/>
-        <p:txBody>
-          <a:bodyPr>
-            <a:normAutofit fontScale="90000"/>
-          </a:bodyPr>
-          <a:lstStyle/>
-          <a:p>
-            <a:r>
-              <a:rPr lang="en-US" dirty="0" smtClean="0"/>
-              <a:t>Spring.NET Code Configuration (Preview)</a:t>
-            </a:r>
-            <a:endParaRPr lang="en-US" dirty="0"/>
-          </a:p>
-        </p:txBody>
-      </p:sp>
-      <p:sp>
-        <p:nvSpPr>
-          <p:cNvPr id="3" name="Rounded Rectangle 2"/>
-          <p:cNvSpPr/>
-          <p:nvPr/>
-        </p:nvSpPr>
-        <p:spPr bwMode="blackWhite">
-          <a:xfrm>
-            <a:off x="431073" y="2286000"/>
-            <a:ext cx="7848600" cy="4267200"/>
-          </a:xfrm>
-          <a:prstGeom prst="roundRect">
-            <a:avLst>
-              <a:gd name="adj" fmla="val 7234"/>
-            </a:avLst>
-          </a:prstGeom>
-          <a:gradFill flip="none" rotWithShape="1">
-            <a:gsLst>
-              <a:gs pos="0">
-                <a:schemeClr val="bg1">
-                  <a:tint val="66000"/>
-                  <a:satMod val="160000"/>
-                </a:schemeClr>
-              </a:gs>
-              <a:gs pos="50000">
-                <a:schemeClr val="bg1">
-                  <a:tint val="44500"/>
-                  <a:satMod val="160000"/>
-                </a:schemeClr>
-              </a:gs>
-              <a:gs pos="100000">
-                <a:schemeClr val="bg1">
-                  <a:tint val="23500"/>
-                  <a:satMod val="160000"/>
-                </a:schemeClr>
-              </a:gs>
-            </a:gsLst>
-            <a:lin ang="16200000" scaled="1"/>
-            <a:tileRect/>
-          </a:gradFill>
-          <a:ln>
-            <a:solidFill>
-              <a:srgbClr val="27728D"/>
-            </a:solidFill>
-            <a:headEnd type="none" w="med" len="med"/>
-            <a:tailEnd type="none" w="med" len="med"/>
-          </a:ln>
-          <a:effectLst/>
-        </p:spPr>
-        <p:style>
-          <a:lnRef idx="0">
-            <a:schemeClr val="accent2"/>
-          </a:lnRef>
-          <a:fillRef idx="3">
-            <a:schemeClr val="accent2"/>
-          </a:fillRef>
-          <a:effectRef idx="3">
-            <a:schemeClr val="accent2"/>
-          </a:effectRef>
-          <a:fontRef idx="minor">
-            <a:schemeClr val="lt1"/>
-          </a:fontRef>
-        </p:style>
-        <p:txBody>
-          <a:bodyPr lIns="109728" tIns="54864" rIns="109728" bIns="54864" anchor="ctr"/>
-          <a:lstStyle/>
-          <a:p>
-            <a:endParaRPr lang="en-US" sz="2800" b="1" dirty="0">
-              <a:solidFill>
-                <a:schemeClr val="tx1"/>
-              </a:solidFill>
-              <a:effectLst>
-                <a:outerShdw blurRad="38100" dist="38100" dir="2700000" algn="tl">
-                  <a:srgbClr val="000000">
-                    <a:alpha val="43137"/>
-                  </a:srgbClr>
-                </a:outerShdw>
-              </a:effectLst>
-              <a:latin typeface="Arial" pitchFamily="34" charset="0"/>
-            </a:endParaRPr>
-          </a:p>
-        </p:txBody>
-      </p:sp>
-      <p:sp>
-        <p:nvSpPr>
-          <p:cNvPr id="4" name="TextBox 2"/>
-          <p:cNvSpPr txBox="1">
-            <a:spLocks noChangeArrowheads="1"/>
-          </p:cNvSpPr>
-          <p:nvPr/>
-        </p:nvSpPr>
-        <p:spPr bwMode="auto">
-          <a:xfrm>
-            <a:off x="507274" y="2286000"/>
-            <a:ext cx="7722326" cy="4185761"/>
-          </a:xfrm>
-          <a:prstGeom prst="rect">
-            <a:avLst/>
-          </a:prstGeom>
-          <a:noFill/>
-          <a:ln w="9525">
-            <a:noFill/>
-            <a:miter lim="800000"/>
-            <a:headEnd/>
-            <a:tailEnd/>
-          </a:ln>
-        </p:spPr>
-        <p:txBody>
-          <a:bodyPr wrap="square">
-            <a:spAutoFit/>
-          </a:bodyPr>
-          <a:lstStyle/>
-          <a:p>
-            <a:r>
-              <a:rPr lang="en-US" sz="1400" b="1" dirty="0" smtClean="0">
-                <a:latin typeface="Courier New" pitchFamily="49" charset="0"/>
-                <a:cs typeface="Courier New" pitchFamily="49" charset="0"/>
-              </a:rPr>
-              <a:t>[</a:t>
-            </a:r>
-            <a:r>
-              <a:rPr lang="en-US" sz="1400" b="1" dirty="0" smtClean="0">
-                <a:solidFill>
-                  <a:srgbClr val="2B91AF"/>
-                </a:solidFill>
-                <a:latin typeface="Courier New" pitchFamily="49" charset="0"/>
-                <a:cs typeface="Courier New" pitchFamily="49" charset="0"/>
-              </a:rPr>
-              <a:t>Configuration</a:t>
-            </a:r>
-            <a:r>
-              <a:rPr lang="en-US" sz="1400" b="1" dirty="0" smtClean="0">
-                <a:latin typeface="Courier New" pitchFamily="49" charset="0"/>
-                <a:cs typeface="Courier New" pitchFamily="49" charset="0"/>
-              </a:rPr>
-              <a:t>]</a:t>
-            </a:r>
-          </a:p>
-          <a:p>
-            <a:r>
-              <a:rPr lang="en-US" sz="1400" b="1" dirty="0" smtClean="0">
-                <a:solidFill>
-                  <a:srgbClr val="0000FF"/>
-                </a:solidFill>
-                <a:latin typeface="Courier New" pitchFamily="49" charset="0"/>
-                <a:cs typeface="Courier New" pitchFamily="49" charset="0"/>
-              </a:rPr>
-              <a:t>public class </a:t>
-            </a:r>
-            <a:r>
-              <a:rPr lang="en-US" sz="1400" b="1" dirty="0" err="1" smtClean="0">
-                <a:solidFill>
-                  <a:srgbClr val="2B91AF"/>
-                </a:solidFill>
-                <a:latin typeface="Courier New" pitchFamily="49" charset="0"/>
-                <a:cs typeface="Courier New" pitchFamily="49" charset="0"/>
-              </a:rPr>
-              <a:t>PrimesConfiguration</a:t>
-            </a:r>
-            <a:r>
-              <a:rPr lang="en-US" sz="1400" b="1" dirty="0" smtClean="0">
-                <a:solidFill>
-                  <a:srgbClr val="2B91AF"/>
-                </a:solidFill>
-                <a:latin typeface="Courier New" pitchFamily="49" charset="0"/>
-                <a:cs typeface="Courier New" pitchFamily="49" charset="0"/>
-              </a:rPr>
-              <a:t> </a:t>
-            </a:r>
-            <a:r>
-              <a:rPr lang="en-US" sz="1400" b="1" dirty="0" smtClean="0">
-                <a:latin typeface="Courier New" pitchFamily="49" charset="0"/>
-                <a:cs typeface="Courier New" pitchFamily="49" charset="0"/>
-              </a:rPr>
-              <a:t>{</a:t>
-            </a:r>
-          </a:p>
-          <a:p>
-            <a:endParaRPr lang="en-US" sz="1400" b="1" dirty="0" smtClean="0">
-              <a:latin typeface="Courier New" pitchFamily="49" charset="0"/>
-              <a:cs typeface="Courier New" pitchFamily="49" charset="0"/>
-            </a:endParaRPr>
-          </a:p>
-          <a:p>
-            <a:r>
-              <a:rPr lang="en-US" sz="1400" b="1" dirty="0" smtClean="0">
-                <a:latin typeface="Courier New" pitchFamily="49" charset="0"/>
-                <a:cs typeface="Courier New" pitchFamily="49" charset="0"/>
-              </a:rPr>
-              <a:t>  [</a:t>
-            </a:r>
-            <a:r>
-              <a:rPr lang="en-US" sz="1400" b="1" dirty="0" smtClean="0">
-                <a:solidFill>
-                  <a:srgbClr val="2B91AF"/>
-                </a:solidFill>
-                <a:latin typeface="Courier New" pitchFamily="49" charset="0"/>
-                <a:cs typeface="Courier New" pitchFamily="49" charset="0"/>
-              </a:rPr>
-              <a:t>Definition</a:t>
-            </a:r>
-            <a:r>
-              <a:rPr lang="en-US" sz="1400" b="1" dirty="0" smtClean="0">
-                <a:latin typeface="Courier New" pitchFamily="49" charset="0"/>
-                <a:cs typeface="Courier New" pitchFamily="49" charset="0"/>
-              </a:rPr>
-              <a:t>]</a:t>
-            </a:r>
-          </a:p>
-          <a:p>
-            <a:r>
-              <a:rPr lang="en-US" sz="1400" b="1" dirty="0" smtClean="0">
-                <a:solidFill>
-                  <a:srgbClr val="0000FF"/>
-                </a:solidFill>
-                <a:latin typeface="Courier New" pitchFamily="49" charset="0"/>
-                <a:cs typeface="Courier New" pitchFamily="49" charset="0"/>
-              </a:rPr>
-              <a:t>  public virtual </a:t>
-            </a:r>
-            <a:r>
-              <a:rPr lang="en-US" sz="1400" b="1" dirty="0" err="1" smtClean="0">
-                <a:solidFill>
-                  <a:srgbClr val="2B91AF"/>
-                </a:solidFill>
-                <a:latin typeface="Courier New" pitchFamily="49" charset="0"/>
-                <a:cs typeface="Courier New" pitchFamily="49" charset="0"/>
-              </a:rPr>
-              <a:t>ConsoleReport</a:t>
-            </a:r>
-            <a:r>
-              <a:rPr lang="en-US" sz="1400" b="1" dirty="0" smtClean="0">
-                <a:solidFill>
-                  <a:srgbClr val="2B91AF"/>
-                </a:solidFill>
-                <a:latin typeface="Courier New" pitchFamily="49" charset="0"/>
-                <a:cs typeface="Courier New" pitchFamily="49" charset="0"/>
-              </a:rPr>
-              <a:t> </a:t>
-            </a:r>
-            <a:r>
-              <a:rPr lang="en-US" sz="1400" b="1" dirty="0" err="1" smtClean="0">
-                <a:latin typeface="Courier New" pitchFamily="49" charset="0"/>
-                <a:cs typeface="Courier New" pitchFamily="49" charset="0"/>
-              </a:rPr>
-              <a:t>ConsoleReport</a:t>
-            </a:r>
-            <a:r>
-              <a:rPr lang="en-US" sz="1400" b="1" dirty="0" smtClean="0">
-                <a:latin typeface="Courier New" pitchFamily="49" charset="0"/>
-                <a:cs typeface="Courier New" pitchFamily="49" charset="0"/>
-              </a:rPr>
-              <a:t>() {</a:t>
-            </a:r>
-          </a:p>
-          <a:p>
-            <a:r>
-              <a:rPr lang="en-US" sz="1400" b="1" dirty="0" smtClean="0">
-                <a:solidFill>
-                  <a:srgbClr val="0000FF"/>
-                </a:solidFill>
-                <a:latin typeface="Courier New" pitchFamily="49" charset="0"/>
-                <a:cs typeface="Courier New" pitchFamily="49" charset="0"/>
-              </a:rPr>
-              <a:t>    return new </a:t>
-            </a:r>
-            <a:r>
-              <a:rPr lang="en-US" sz="1400" b="1" dirty="0" err="1" smtClean="0">
-                <a:solidFill>
-                  <a:srgbClr val="2B91AF"/>
-                </a:solidFill>
-                <a:latin typeface="Courier New" pitchFamily="49" charset="0"/>
-                <a:cs typeface="Courier New" pitchFamily="49" charset="0"/>
-              </a:rPr>
-              <a:t>ConsoleReport</a:t>
-            </a:r>
-            <a:r>
-              <a:rPr lang="en-US" sz="1400" b="1" dirty="0" smtClean="0">
-                <a:latin typeface="Courier New" pitchFamily="49" charset="0"/>
-                <a:cs typeface="Courier New" pitchFamily="49" charset="0"/>
-              </a:rPr>
-              <a:t>(</a:t>
-            </a:r>
-            <a:r>
-              <a:rPr lang="en-US" sz="1400" b="1" dirty="0" err="1" smtClean="0">
-                <a:latin typeface="Courier New" pitchFamily="49" charset="0"/>
-                <a:cs typeface="Courier New" pitchFamily="49" charset="0"/>
-              </a:rPr>
-              <a:t>OutputFormatter</a:t>
-            </a:r>
-            <a:r>
-              <a:rPr lang="en-US" sz="1400" b="1" dirty="0" smtClean="0">
-                <a:latin typeface="Courier New" pitchFamily="49" charset="0"/>
-                <a:cs typeface="Courier New" pitchFamily="49" charset="0"/>
-              </a:rPr>
-              <a:t>(), </a:t>
-            </a:r>
-            <a:r>
-              <a:rPr lang="en-US" sz="1400" b="1" dirty="0" err="1" smtClean="0">
-                <a:latin typeface="Courier New" pitchFamily="49" charset="0"/>
-                <a:cs typeface="Courier New" pitchFamily="49" charset="0"/>
-              </a:rPr>
-              <a:t>PrimeGenerator</a:t>
-            </a:r>
-            <a:r>
-              <a:rPr lang="en-US" sz="1400" b="1" dirty="0" smtClean="0">
-                <a:latin typeface="Courier New" pitchFamily="49" charset="0"/>
-                <a:cs typeface="Courier New" pitchFamily="49" charset="0"/>
-              </a:rPr>
-              <a:t>()) </a:t>
-            </a:r>
-          </a:p>
-          <a:p>
-            <a:r>
-              <a:rPr lang="en-US" sz="1400" b="1" dirty="0" smtClean="0">
-                <a:latin typeface="Courier New" pitchFamily="49" charset="0"/>
-                <a:cs typeface="Courier New" pitchFamily="49" charset="0"/>
-              </a:rPr>
-              <a:t>                             {</a:t>
-            </a:r>
-            <a:r>
-              <a:rPr lang="en-US" sz="1400" b="1" dirty="0" err="1" smtClean="0">
-                <a:latin typeface="Courier New" pitchFamily="49" charset="0"/>
-                <a:cs typeface="Courier New" pitchFamily="49" charset="0"/>
-              </a:rPr>
-              <a:t>MaxNumber</a:t>
-            </a:r>
-            <a:r>
-              <a:rPr lang="en-US" sz="1400" b="1" dirty="0" smtClean="0">
-                <a:latin typeface="Courier New" pitchFamily="49" charset="0"/>
-                <a:cs typeface="Courier New" pitchFamily="49" charset="0"/>
-              </a:rPr>
-              <a:t> = 1000};</a:t>
-            </a:r>
-          </a:p>
-          <a:p>
-            <a:r>
-              <a:rPr lang="en-US" sz="1400" b="1" dirty="0" smtClean="0">
-                <a:latin typeface="Courier New" pitchFamily="49" charset="0"/>
-                <a:cs typeface="Courier New" pitchFamily="49" charset="0"/>
-              </a:rPr>
-              <a:t>  }</a:t>
-            </a:r>
-          </a:p>
-          <a:p>
-            <a:endParaRPr lang="en-US" sz="1400" b="1" dirty="0" smtClean="0">
-              <a:solidFill>
-                <a:srgbClr val="2B91AF"/>
-              </a:solidFill>
-              <a:latin typeface="Courier New" pitchFamily="49" charset="0"/>
-              <a:cs typeface="Courier New" pitchFamily="49" charset="0"/>
-            </a:endParaRPr>
-          </a:p>
-          <a:p>
-            <a:r>
-              <a:rPr lang="en-US" sz="1400" b="1" dirty="0" smtClean="0">
-                <a:latin typeface="Courier New" pitchFamily="49" charset="0"/>
-                <a:cs typeface="Courier New" pitchFamily="49" charset="0"/>
-              </a:rPr>
-              <a:t>  [</a:t>
-            </a:r>
-            <a:r>
-              <a:rPr lang="en-US" sz="1400" b="1" dirty="0" smtClean="0">
-                <a:solidFill>
-                  <a:srgbClr val="2B91AF"/>
-                </a:solidFill>
-                <a:latin typeface="Courier New" pitchFamily="49" charset="0"/>
-                <a:cs typeface="Courier New" pitchFamily="49" charset="0"/>
-              </a:rPr>
-              <a:t>Definition</a:t>
-            </a:r>
-            <a:r>
-              <a:rPr lang="en-US" sz="1400" b="1" dirty="0" smtClean="0">
-                <a:latin typeface="Courier New" pitchFamily="49" charset="0"/>
-                <a:cs typeface="Courier New" pitchFamily="49" charset="0"/>
-              </a:rPr>
-              <a:t>]</a:t>
-            </a:r>
-          </a:p>
-          <a:p>
-            <a:r>
-              <a:rPr lang="en-US" sz="1400" b="1" dirty="0" smtClean="0">
-                <a:solidFill>
-                  <a:srgbClr val="0000FF"/>
-                </a:solidFill>
-                <a:latin typeface="Courier New" pitchFamily="49" charset="0"/>
-                <a:cs typeface="Courier New" pitchFamily="49" charset="0"/>
-              </a:rPr>
-              <a:t>  public virtual </a:t>
-            </a:r>
-            <a:r>
-              <a:rPr lang="en-US" sz="1400" b="1" dirty="0" err="1" smtClean="0">
-                <a:solidFill>
-                  <a:srgbClr val="2B91AF"/>
-                </a:solidFill>
-                <a:latin typeface="Courier New" pitchFamily="49" charset="0"/>
-                <a:cs typeface="Courier New" pitchFamily="49" charset="0"/>
-              </a:rPr>
-              <a:t>IOutputFormatter</a:t>
-            </a:r>
-            <a:r>
-              <a:rPr lang="en-US" sz="1400" b="1" dirty="0" smtClean="0">
-                <a:solidFill>
-                  <a:srgbClr val="2B91AF"/>
-                </a:solidFill>
-                <a:latin typeface="Courier New" pitchFamily="49" charset="0"/>
-                <a:cs typeface="Courier New" pitchFamily="49" charset="0"/>
-              </a:rPr>
-              <a:t> </a:t>
-            </a:r>
-            <a:r>
-              <a:rPr lang="en-US" sz="1400" b="1" dirty="0" err="1" smtClean="0">
-                <a:latin typeface="Courier New" pitchFamily="49" charset="0"/>
-                <a:cs typeface="Courier New" pitchFamily="49" charset="0"/>
-              </a:rPr>
-              <a:t>OutputFormatter</a:t>
-            </a:r>
-            <a:r>
-              <a:rPr lang="en-US" sz="1400" b="1" dirty="0" smtClean="0">
-                <a:latin typeface="Courier New" pitchFamily="49" charset="0"/>
-                <a:cs typeface="Courier New" pitchFamily="49" charset="0"/>
-              </a:rPr>
-              <a:t>() {</a:t>
-            </a:r>
-          </a:p>
-          <a:p>
-            <a:r>
-              <a:rPr lang="en-US" sz="1400" b="1" dirty="0" smtClean="0">
-                <a:solidFill>
-                  <a:srgbClr val="2B91AF"/>
-                </a:solidFill>
-                <a:latin typeface="Courier New" pitchFamily="49" charset="0"/>
-                <a:cs typeface="Courier New" pitchFamily="49" charset="0"/>
-              </a:rPr>
-              <a:t>    </a:t>
-            </a:r>
-            <a:r>
-              <a:rPr lang="en-US" sz="1400" b="1" dirty="0" smtClean="0">
-                <a:solidFill>
-                  <a:srgbClr val="0000FF"/>
-                </a:solidFill>
-                <a:latin typeface="Courier New" pitchFamily="49" charset="0"/>
-                <a:cs typeface="Courier New" pitchFamily="49" charset="0"/>
-              </a:rPr>
-              <a:t>return new </a:t>
-            </a:r>
-            <a:r>
-              <a:rPr lang="en-US" sz="1400" b="1" dirty="0" err="1" smtClean="0">
-                <a:solidFill>
-                  <a:srgbClr val="2B91AF"/>
-                </a:solidFill>
-                <a:latin typeface="Courier New" pitchFamily="49" charset="0"/>
-                <a:cs typeface="Courier New" pitchFamily="49" charset="0"/>
-              </a:rPr>
-              <a:t>OutputFormatter</a:t>
-            </a:r>
-            <a:r>
-              <a:rPr lang="en-US" sz="1400" b="1" dirty="0" smtClean="0">
-                <a:latin typeface="Courier New" pitchFamily="49" charset="0"/>
-                <a:cs typeface="Courier New" pitchFamily="49" charset="0"/>
-              </a:rPr>
-              <a:t>();</a:t>
-            </a:r>
-          </a:p>
-          <a:p>
-            <a:r>
-              <a:rPr lang="en-US" sz="1400" b="1" dirty="0" smtClean="0">
-                <a:latin typeface="Courier New" pitchFamily="49" charset="0"/>
-                <a:cs typeface="Courier New" pitchFamily="49" charset="0"/>
-              </a:rPr>
-              <a:t>  }</a:t>
-            </a:r>
-          </a:p>
-          <a:p>
-            <a:endParaRPr lang="en-US" sz="1400" b="1" dirty="0" smtClean="0">
-              <a:solidFill>
-                <a:srgbClr val="2B91AF"/>
-              </a:solidFill>
-              <a:latin typeface="Courier New" pitchFamily="49" charset="0"/>
-              <a:cs typeface="Courier New" pitchFamily="49" charset="0"/>
-            </a:endParaRPr>
-          </a:p>
-          <a:p>
-            <a:r>
-              <a:rPr lang="en-US" sz="1400" b="1" dirty="0" smtClean="0">
-                <a:solidFill>
-                  <a:srgbClr val="2B91AF"/>
-                </a:solidFill>
-                <a:latin typeface="Courier New" pitchFamily="49" charset="0"/>
-                <a:cs typeface="Courier New" pitchFamily="49" charset="0"/>
-              </a:rPr>
-              <a:t>  [Definition]</a:t>
-            </a:r>
-          </a:p>
-          <a:p>
-            <a:r>
-              <a:rPr lang="en-US" sz="1400" b="1" dirty="0" smtClean="0">
-                <a:solidFill>
-                  <a:srgbClr val="0000FF"/>
-                </a:solidFill>
-                <a:latin typeface="Courier New" pitchFamily="49" charset="0"/>
-                <a:cs typeface="Courier New" pitchFamily="49" charset="0"/>
-              </a:rPr>
-              <a:t>  public virtual </a:t>
-            </a:r>
-            <a:r>
-              <a:rPr lang="en-US" sz="1400" b="1" dirty="0" err="1" smtClean="0">
-                <a:solidFill>
-                  <a:srgbClr val="2B91AF"/>
-                </a:solidFill>
-                <a:latin typeface="Courier New" pitchFamily="49" charset="0"/>
-                <a:cs typeface="Courier New" pitchFamily="49" charset="0"/>
-              </a:rPr>
-              <a:t>IPrimeGenerator</a:t>
-            </a:r>
-            <a:r>
-              <a:rPr lang="en-US" sz="1400" b="1" dirty="0" smtClean="0">
-                <a:solidFill>
-                  <a:srgbClr val="2B91AF"/>
-                </a:solidFill>
-                <a:latin typeface="Courier New" pitchFamily="49" charset="0"/>
-                <a:cs typeface="Courier New" pitchFamily="49" charset="0"/>
-              </a:rPr>
-              <a:t> </a:t>
-            </a:r>
-            <a:r>
-              <a:rPr lang="en-US" sz="1400" b="1" dirty="0" err="1" smtClean="0">
-                <a:latin typeface="Courier New" pitchFamily="49" charset="0"/>
-                <a:cs typeface="Courier New" pitchFamily="49" charset="0"/>
-              </a:rPr>
-              <a:t>PrimeGenerator</a:t>
-            </a:r>
-            <a:r>
-              <a:rPr lang="en-US" sz="1400" b="1" dirty="0" smtClean="0">
-                <a:latin typeface="Courier New" pitchFamily="49" charset="0"/>
-                <a:cs typeface="Courier New" pitchFamily="49" charset="0"/>
-              </a:rPr>
-              <a:t>() </a:t>
-            </a:r>
-            <a:r>
-              <a:rPr lang="en-US" sz="1400" b="1" dirty="0" smtClean="0">
-                <a:solidFill>
-                  <a:srgbClr val="2B91AF"/>
-                </a:solidFill>
-                <a:latin typeface="Courier New" pitchFamily="49" charset="0"/>
-                <a:cs typeface="Courier New" pitchFamily="49" charset="0"/>
-              </a:rPr>
-              <a:t>{</a:t>
-            </a:r>
-          </a:p>
-          <a:p>
-            <a:r>
-              <a:rPr lang="en-US" sz="1400" b="1" dirty="0" smtClean="0">
-                <a:solidFill>
-                  <a:srgbClr val="0000FF"/>
-                </a:solidFill>
-                <a:latin typeface="Courier New" pitchFamily="49" charset="0"/>
-                <a:cs typeface="Courier New" pitchFamily="49" charset="0"/>
-              </a:rPr>
-              <a:t>    return new </a:t>
-            </a:r>
-            <a:r>
-              <a:rPr lang="en-US" sz="1400" b="1" dirty="0" err="1" smtClean="0">
-                <a:solidFill>
-                  <a:srgbClr val="2B91AF"/>
-                </a:solidFill>
-                <a:latin typeface="Courier New" pitchFamily="49" charset="0"/>
-                <a:cs typeface="Courier New" pitchFamily="49" charset="0"/>
-              </a:rPr>
-              <a:t>PrimeGenerator</a:t>
-            </a:r>
-            <a:r>
-              <a:rPr lang="en-US" sz="1400" b="1" dirty="0" smtClean="0">
-                <a:latin typeface="Courier New" pitchFamily="49" charset="0"/>
-                <a:cs typeface="Courier New" pitchFamily="49" charset="0"/>
-              </a:rPr>
-              <a:t>(</a:t>
-            </a:r>
-            <a:r>
-              <a:rPr lang="en-US" sz="1400" b="1" dirty="0" smtClean="0">
-                <a:solidFill>
-                  <a:srgbClr val="0000FF"/>
-                </a:solidFill>
-                <a:latin typeface="Courier New" pitchFamily="49" charset="0"/>
-                <a:cs typeface="Courier New" pitchFamily="49" charset="0"/>
-              </a:rPr>
-              <a:t>new </a:t>
-            </a:r>
-            <a:r>
-              <a:rPr lang="en-US" sz="1400" b="1" dirty="0" err="1" smtClean="0">
-                <a:solidFill>
-                  <a:srgbClr val="2B91AF"/>
-                </a:solidFill>
-                <a:latin typeface="Courier New" pitchFamily="49" charset="0"/>
-                <a:cs typeface="Courier New" pitchFamily="49" charset="0"/>
-              </a:rPr>
-              <a:t>PrimeEvaluationEngine</a:t>
-            </a:r>
-            <a:r>
-              <a:rPr lang="en-US" sz="1400" b="1" dirty="0" smtClean="0">
-                <a:latin typeface="Courier New" pitchFamily="49" charset="0"/>
-                <a:cs typeface="Courier New" pitchFamily="49" charset="0"/>
-              </a:rPr>
-              <a:t>());</a:t>
-            </a:r>
-          </a:p>
-          <a:p>
-            <a:r>
-              <a:rPr lang="en-US" sz="1400" b="1" dirty="0" smtClean="0">
-                <a:latin typeface="Courier New" pitchFamily="49" charset="0"/>
-                <a:cs typeface="Courier New" pitchFamily="49" charset="0"/>
-              </a:rPr>
-              <a:t>  }</a:t>
-            </a:r>
-          </a:p>
-          <a:p>
-            <a:r>
-              <a:rPr lang="en-US" sz="1400" b="1" dirty="0" smtClean="0">
-                <a:latin typeface="Courier New" pitchFamily="49" charset="0"/>
-                <a:cs typeface="Courier New" pitchFamily="49" charset="0"/>
-              </a:rPr>
-              <a:t>}</a:t>
-            </a:r>
-            <a:endParaRPr lang="en-US" sz="1400" b="1" dirty="0">
-              <a:latin typeface="Courier New" pitchFamily="49" charset="0"/>
-              <a:cs typeface="Courier New" pitchFamily="49" charset="0"/>
-            </a:endParaRPr>
-          </a:p>
-        </p:txBody>
-      </p:sp>
-    </p:spTree>
-  </p:cSld>
-  <p:clrMapOvr>
-    <a:masterClrMapping/>
-  </p:clrMapOvr>
-  <p:timing>
-    <p:tnLst>
-      <p:par>
-        <p:cTn id="1" dur="indefinite" restart="never" nodeType="tmRoot"/>
-      </p:par>
-    </p:tnLst>
-  </p:timing>
-</p:sld>
-</file>
-
-<file path=ppt/slides/slide38.xml><?xml version="1.0" encoding="utf-8"?>
-<p:sld xmlns:a="http://schemas.openxmlformats.org/drawingml/2006/main" xmlns:r="http://schemas.openxmlformats.org/officeDocument/2006/relationships" xmlns:p="http://schemas.openxmlformats.org/presentationml/2006/main">
-  <p:cSld>
-    <p:spTree>
-      <p:nvGrpSpPr>
-        <p:cNvPr id="1" name=""/>
-        <p:cNvGrpSpPr/>
-        <p:nvPr/>
-      </p:nvGrpSpPr>
-      <p:grpSpPr>
-        <a:xfrm>
-          <a:off x="0" y="0"/>
-          <a:ext cx="0" cy="0"/>
-          <a:chOff x="0" y="0"/>
-          <a:chExt cx="0" cy="0"/>
-        </a:xfrm>
-      </p:grpSpPr>
-      <p:sp>
-        <p:nvSpPr>
-          <p:cNvPr id="2" name="Title 1"/>
-          <p:cNvSpPr>
-            <a:spLocks noGrp="1"/>
-          </p:cNvSpPr>
-          <p:nvPr>
-            <p:ph type="title"/>
-          </p:nvPr>
-        </p:nvSpPr>
-        <p:spPr/>
-        <p:txBody>
-          <a:bodyPr/>
-          <a:lstStyle/>
-          <a:p>
-            <a:r>
-              <a:rPr lang="en-US" dirty="0" smtClean="0"/>
-              <a:t>Dependency Injection Summary</a:t>
-            </a:r>
-            <a:endParaRPr lang="en-US" dirty="0"/>
-          </a:p>
-        </p:txBody>
-      </p:sp>
-      <p:sp>
-        <p:nvSpPr>
-          <p:cNvPr id="3" name="Content Placeholder 2"/>
-          <p:cNvSpPr>
-            <a:spLocks noGrp="1"/>
-          </p:cNvSpPr>
-          <p:nvPr>
-            <p:ph idx="1"/>
-          </p:nvPr>
-        </p:nvSpPr>
-        <p:spPr>
-          <a:xfrm>
-            <a:off x="457200" y="2057400"/>
-            <a:ext cx="8229600" cy="4419600"/>
-          </a:xfrm>
-        </p:spPr>
-        <p:txBody>
-          <a:bodyPr>
-            <a:normAutofit fontScale="92500" lnSpcReduction="20000"/>
-          </a:bodyPr>
-          <a:lstStyle/>
-          <a:p>
-            <a:r>
-              <a:rPr lang="en-US" dirty="0" smtClean="0"/>
-              <a:t>Benefits</a:t>
-            </a:r>
-          </a:p>
-          <a:p>
-            <a:pPr lvl="1"/>
-            <a:r>
-              <a:rPr lang="en-US" dirty="0" smtClean="0"/>
-              <a:t>Code easier to test and maintain</a:t>
-            </a:r>
-          </a:p>
-          <a:p>
-            <a:pPr lvl="1"/>
-            <a:r>
-              <a:rPr lang="en-US" dirty="0" smtClean="0"/>
-              <a:t>Promotes loose coupling between</a:t>
-            </a:r>
-          </a:p>
-          <a:p>
-            <a:pPr lvl="2"/>
-            <a:r>
-              <a:rPr lang="en-US" dirty="0" smtClean="0"/>
-              <a:t>Classes</a:t>
-            </a:r>
-          </a:p>
-          <a:p>
-            <a:pPr lvl="2"/>
-            <a:r>
-              <a:rPr lang="en-US" dirty="0" smtClean="0"/>
-              <a:t>“Modules”/Subsystems</a:t>
-            </a:r>
-          </a:p>
-          <a:p>
-            <a:pPr lvl="1"/>
-            <a:r>
-              <a:rPr lang="en-US" dirty="0" smtClean="0"/>
-              <a:t>Will see signs of</a:t>
-            </a:r>
-          </a:p>
-          <a:p>
-            <a:pPr lvl="2"/>
-            <a:r>
-              <a:rPr lang="en-US" dirty="0" smtClean="0"/>
-              <a:t>Reuse</a:t>
-            </a:r>
-          </a:p>
-          <a:p>
-            <a:pPr lvl="2"/>
-            <a:r>
-              <a:rPr lang="en-US" dirty="0" smtClean="0"/>
-              <a:t>Better code – ‘harder to do bad things’</a:t>
-            </a:r>
-          </a:p>
-          <a:p>
-            <a:r>
-              <a:rPr lang="en-US" dirty="0" smtClean="0"/>
-              <a:t>Drawbacks</a:t>
-            </a:r>
-          </a:p>
-          <a:p>
-            <a:pPr lvl="1"/>
-            <a:r>
-              <a:rPr lang="en-US" dirty="0" smtClean="0"/>
-              <a:t>Another level of abstraction</a:t>
-            </a:r>
-          </a:p>
-          <a:p>
-            <a:pPr lvl="1"/>
-            <a:r>
-              <a:rPr lang="en-US" dirty="0" smtClean="0"/>
-              <a:t>Need to learn a DI container technology</a:t>
-            </a:r>
-          </a:p>
-          <a:p>
-            <a:pPr lvl="1"/>
-            <a:endParaRPr lang="en-US" dirty="0" smtClean="0"/>
-          </a:p>
-          <a:p>
-            <a:pPr lvl="2"/>
-            <a:endParaRPr lang="en-US" dirty="0"/>
-          </a:p>
-        </p:txBody>
-      </p:sp>
-    </p:spTree>
-  </p:cSld>
-  <p:clrMapOvr>
-    <a:masterClrMapping/>
-  </p:clrMapOvr>
-  <p:timing>
-    <p:tnLst>
-      <p:par>
-        <p:cTn id="1" dur="indefinite" restart="never" nodeType="tmRoot"/>
-      </p:par>
-    </p:tnLst>
-  </p:timing>
-</p:sld>
-</file>
-
 <file path=ppt/slides/slide39.xml><?xml version="1.0" encoding="utf-8"?>
 <p:sld xmlns:a="http://schemas.openxmlformats.org/drawingml/2006/main" xmlns:r="http://schemas.openxmlformats.org/officeDocument/2006/relationships" xmlns:p="http://schemas.openxmlformats.org/presentationml/2006/main">
   <p:cSld>
@@ -25920,7 +26594,7 @@
           <a:p>
             <a:r>
               <a:rPr lang="en-US" dirty="0" smtClean="0"/>
-              <a:t>Dependency Injection LAB</a:t>
+              <a:t>Dependency Injection Summary</a:t>
             </a:r>
             <a:endParaRPr lang="en-US" dirty="0"/>
           </a:p>
@@ -25928,76 +26602,107 @@
       </p:sp>
       <p:sp>
         <p:nvSpPr>
-          <p:cNvPr id="3" name="Text Placeholder 2"/>
+          <p:cNvPr id="3" name="Content Placeholder 2"/>
           <p:cNvSpPr>
             <a:spLocks noGrp="1"/>
           </p:cNvSpPr>
           <p:nvPr>
-            <p:ph type="body" idx="1"/>
+            <p:ph idx="1"/>
           </p:nvPr>
-        </p:nvSpPr>
-        <p:spPr/>
-        <p:txBody>
-          <a:bodyPr/>
-          <a:lstStyle/>
-          <a:p>
-            <a:r>
-              <a:rPr lang="en-US" dirty="0" smtClean="0"/>
-              <a:t>Insert Tab A into Slot B…</a:t>
-            </a:r>
-            <a:endParaRPr lang="en-US" dirty="0"/>
-          </a:p>
-        </p:txBody>
-      </p:sp>
-      <p:sp>
-        <p:nvSpPr>
-          <p:cNvPr id="5" name="Rectangle 4"/>
-          <p:cNvSpPr/>
-          <p:nvPr/>
         </p:nvSpPr>
         <p:spPr>
           <a:xfrm>
-            <a:off x="5105400" y="1676400"/>
-            <a:ext cx="3657600" cy="1295400"/>
+            <a:off x="457200" y="2057400"/>
+            <a:ext cx="8229600" cy="4419600"/>
           </a:xfrm>
-          <a:prstGeom prst="rect">
-            <a:avLst/>
-          </a:prstGeom>
-          <a:solidFill>
-            <a:schemeClr val="tx1"/>
-          </a:solidFill>
-          <a:ln>
-            <a:solidFill>
-              <a:schemeClr val="tx1"/>
-            </a:solidFill>
-          </a:ln>
         </p:spPr>
-        <p:style>
-          <a:lnRef idx="2">
-            <a:schemeClr val="accent1">
-              <a:shade val="50000"/>
-            </a:schemeClr>
-          </a:lnRef>
-          <a:fillRef idx="1">
-            <a:schemeClr val="accent1"/>
-          </a:fillRef>
-          <a:effectRef idx="0">
-            <a:schemeClr val="accent1"/>
-          </a:effectRef>
-          <a:fontRef idx="minor">
-            <a:schemeClr val="lt1"/>
-          </a:fontRef>
-        </p:style>
         <p:txBody>
-          <a:bodyPr rtlCol="0" anchor="ctr"/>
+          <a:bodyPr>
+            <a:normAutofit fontScale="92500" lnSpcReduction="20000"/>
+          </a:bodyPr>
           <a:lstStyle/>
           <a:p>
-            <a:pPr algn="ctr"/>
-            <a:endParaRPr lang="en-US" dirty="0">
-              <a:solidFill>
-                <a:schemeClr val="tx1"/>
-              </a:solidFill>
-            </a:endParaRPr>
+            <a:r>
+              <a:rPr lang="en-US" dirty="0" smtClean="0"/>
+              <a:t>Benefits</a:t>
+            </a:r>
+          </a:p>
+          <a:p>
+            <a:pPr lvl="1"/>
+            <a:r>
+              <a:rPr lang="en-US" dirty="0" smtClean="0"/>
+              <a:t>Code easier to test and maintain</a:t>
+            </a:r>
+          </a:p>
+          <a:p>
+            <a:pPr lvl="1"/>
+            <a:r>
+              <a:rPr lang="en-US" dirty="0" smtClean="0"/>
+              <a:t>Promotes loose coupling between</a:t>
+            </a:r>
+          </a:p>
+          <a:p>
+            <a:pPr lvl="2"/>
+            <a:r>
+              <a:rPr lang="en-US" dirty="0" smtClean="0"/>
+              <a:t>Classes</a:t>
+            </a:r>
+          </a:p>
+          <a:p>
+            <a:pPr lvl="2"/>
+            <a:r>
+              <a:rPr lang="en-US" dirty="0" smtClean="0"/>
+              <a:t>“Modules”/Subsystems</a:t>
+            </a:r>
+          </a:p>
+          <a:p>
+            <a:pPr lvl="1"/>
+            <a:r>
+              <a:rPr lang="en-US" dirty="0" smtClean="0"/>
+              <a:t>Will see signs of</a:t>
+            </a:r>
+          </a:p>
+          <a:p>
+            <a:pPr lvl="2"/>
+            <a:r>
+              <a:rPr lang="en-US" dirty="0" smtClean="0"/>
+              <a:t>Reuse</a:t>
+            </a:r>
+          </a:p>
+          <a:p>
+            <a:pPr lvl="2"/>
+            <a:r>
+              <a:rPr lang="en-US" dirty="0" smtClean="0"/>
+              <a:t>Better code – ‘harder to do bad things’</a:t>
+            </a:r>
+          </a:p>
+          <a:p>
+            <a:r>
+              <a:rPr lang="en-US" dirty="0" smtClean="0"/>
+              <a:t>Drawbacks</a:t>
+            </a:r>
+          </a:p>
+          <a:p>
+            <a:pPr lvl="1"/>
+            <a:r>
+              <a:rPr lang="en-US" dirty="0" smtClean="0"/>
+              <a:t>Another level of abstraction</a:t>
+            </a:r>
+          </a:p>
+          <a:p>
+            <a:pPr lvl="1"/>
+            <a:r>
+              <a:rPr lang="en-US" dirty="0" smtClean="0"/>
+              <a:t>Need to learn a DI container technology</a:t>
+            </a:r>
+          </a:p>
+          <a:p>
+            <a:pPr lvl="1"/>
+            <a:endParaRPr lang="en-US" dirty="0" smtClean="0"/>
+          </a:p>
+          <a:p>
+            <a:pPr lvl="2"/>
+            <a:endParaRPr lang="en-US" dirty="0"/>
           </a:p>
         </p:txBody>
       </p:sp>
@@ -26073,6 +26778,136 @@
 </file>
 
 <file path=ppt/slides/slide40.xml><?xml version="1.0" encoding="utf-8"?>
+<p:sld xmlns:a="http://schemas.openxmlformats.org/drawingml/2006/main" xmlns:r="http://schemas.openxmlformats.org/officeDocument/2006/relationships" xmlns:p="http://schemas.openxmlformats.org/presentationml/2006/main">
+  <p:cSld>
+    <p:spTree>
+      <p:nvGrpSpPr>
+        <p:cNvPr id="1" name=""/>
+        <p:cNvGrpSpPr/>
+        <p:nvPr/>
+      </p:nvGrpSpPr>
+      <p:grpSpPr>
+        <a:xfrm>
+          <a:off x="0" y="0"/>
+          <a:ext cx="0" cy="0"/>
+          <a:chOff x="0" y="0"/>
+          <a:chExt cx="0" cy="0"/>
+        </a:xfrm>
+      </p:grpSpPr>
+      <p:sp>
+        <p:nvSpPr>
+          <p:cNvPr id="2" name="Title 1"/>
+          <p:cNvSpPr>
+            <a:spLocks noGrp="1"/>
+          </p:cNvSpPr>
+          <p:nvPr>
+            <p:ph type="title"/>
+          </p:nvPr>
+        </p:nvSpPr>
+        <p:spPr/>
+        <p:txBody>
+          <a:bodyPr/>
+          <a:lstStyle/>
+          <a:p>
+            <a:r>
+              <a:rPr lang="en-US" dirty="0" smtClean="0"/>
+              <a:t>Dependency Injection LAB</a:t>
+            </a:r>
+            <a:endParaRPr lang="en-US" dirty="0"/>
+          </a:p>
+        </p:txBody>
+      </p:sp>
+      <p:sp>
+        <p:nvSpPr>
+          <p:cNvPr id="3" name="Text Placeholder 2"/>
+          <p:cNvSpPr>
+            <a:spLocks noGrp="1"/>
+          </p:cNvSpPr>
+          <p:nvPr>
+            <p:ph type="body" idx="1"/>
+          </p:nvPr>
+        </p:nvSpPr>
+        <p:spPr/>
+        <p:txBody>
+          <a:bodyPr/>
+          <a:lstStyle/>
+          <a:p>
+            <a:r>
+              <a:rPr lang="en-US" dirty="0" smtClean="0"/>
+              <a:t>Insert Tab A into Slot B…</a:t>
+            </a:r>
+            <a:endParaRPr lang="en-US" dirty="0"/>
+          </a:p>
+        </p:txBody>
+      </p:sp>
+      <p:sp>
+        <p:nvSpPr>
+          <p:cNvPr id="5" name="Rectangle 4"/>
+          <p:cNvSpPr/>
+          <p:nvPr/>
+        </p:nvSpPr>
+        <p:spPr>
+          <a:xfrm>
+            <a:off x="5105400" y="1676400"/>
+            <a:ext cx="3657600" cy="1295400"/>
+          </a:xfrm>
+          <a:prstGeom prst="rect">
+            <a:avLst/>
+          </a:prstGeom>
+          <a:solidFill>
+            <a:schemeClr val="tx1"/>
+          </a:solidFill>
+          <a:ln>
+            <a:solidFill>
+              <a:schemeClr val="tx1"/>
+            </a:solidFill>
+          </a:ln>
+        </p:spPr>
+        <p:style>
+          <a:lnRef idx="2">
+            <a:schemeClr val="accent1">
+              <a:shade val="50000"/>
+            </a:schemeClr>
+          </a:lnRef>
+          <a:fillRef idx="1">
+            <a:schemeClr val="accent1"/>
+          </a:fillRef>
+          <a:effectRef idx="0">
+            <a:schemeClr val="accent1"/>
+          </a:effectRef>
+          <a:fontRef idx="minor">
+            <a:schemeClr val="lt1"/>
+          </a:fontRef>
+        </p:style>
+        <p:txBody>
+          <a:bodyPr rtlCol="0" anchor="ctr"/>
+          <a:lstStyle/>
+          <a:p>
+            <a:pPr algn="ctr"/>
+            <a:endParaRPr lang="en-US" dirty="0">
+              <a:solidFill>
+                <a:schemeClr val="tx1"/>
+              </a:solidFill>
+            </a:endParaRPr>
+          </a:p>
+        </p:txBody>
+      </p:sp>
+    </p:spTree>
+  </p:cSld>
+  <p:clrMapOvr>
+    <a:masterClrMapping/>
+  </p:clrMapOvr>
+  <p:timing>
+    <p:tnLst>
+      <p:par>
+        <p:cTn id="1" dur="indefinite" restart="never" nodeType="tmRoot"/>
+      </p:par>
+    </p:tnLst>
+  </p:timing>
+</p:sld>
+</file>
+
+<file path=ppt/slides/slide41.xml><?xml version="1.0" encoding="utf-8"?>
 <p:sld xmlns:a="http://schemas.openxmlformats.org/drawingml/2006/main" xmlns:r="http://schemas.openxmlformats.org/officeDocument/2006/relationships" xmlns:p="http://schemas.openxmlformats.org/presentationml/2006/main">
   <p:cSld>
     <p:spTree>

</xml_diff>